<commit_message>
Précision sur la slide derreur de troncature
</commit_message>
<xml_diff>
--- a/MEC8211-Devoir1.pptx
+++ b/MEC8211-Devoir1.pptx
@@ -6747,6 +6747,223 @@
           </p:sp>
         </mc:Fallback>
       </mc:AlternateContent>
+      <p:sp>
+        <p:nvSpPr>
+          <p:cNvPr id="4" name="ZoneTexte 3">
+            <a:extLst>
+              <a:ext uri="{FF2B5EF4-FFF2-40B4-BE49-F238E27FC236}">
+                <a16:creationId xmlns:a16="http://schemas.microsoft.com/office/drawing/2014/main" id="{2B8FA286-F00E-8B4D-BE33-75983933812F}"/>
+              </a:ext>
+            </a:extLst>
+          </p:cNvPr>
+          <p:cNvSpPr txBox="1"/>
+          <p:nvPr/>
+        </p:nvSpPr>
+        <p:spPr>
+          <a:xfrm>
+            <a:off x="6364586" y="2770360"/>
+            <a:ext cx="4879818" cy="2862322"/>
+          </a:xfrm>
+          <a:prstGeom prst="rect">
+            <a:avLst/>
+          </a:prstGeom>
+          <a:noFill/>
+        </p:spPr>
+        <p:txBody>
+          <a:bodyPr wrap="square" rtlCol="0">
+            <a:spAutoFit/>
+          </a:bodyPr>
+          <a:lstStyle/>
+          <a:p>
+            <a:r>
+              <a:rPr lang="fr-CA" dirty="0"/>
+              <a:t>Procédure de résolution :</a:t>
+            </a:r>
+            <a:br>
+              <a:rPr lang="fr-CA" dirty="0"/>
+            </a:br>
+            <a:br>
+              <a:rPr lang="fr-CA" dirty="0"/>
+            </a:br>
+            <a:r>
+              <a:rPr lang="fr-CA" dirty="0"/>
+              <a:t>Construire le système matriciel Ax = b correspondant à l'ensemble des équations de discrétisation et des conditions limites. La matrice A est constitué de tous les coefficients des x, et le vecteur b est constitué de tous les autres termes. Puis, la librairie </a:t>
+            </a:r>
+            <a:r>
+              <a:rPr lang="fr-CA" dirty="0" err="1"/>
+              <a:t>Numpy</a:t>
+            </a:r>
+            <a:r>
+              <a:rPr lang="fr-CA" dirty="0"/>
+              <a:t> fourni l'outil </a:t>
+            </a:r>
+            <a:r>
+              <a:rPr lang="fr-CA" dirty="0" err="1"/>
+              <a:t>numpy.linalg.solve</a:t>
+            </a:r>
+            <a:r>
+              <a:rPr lang="fr-CA" dirty="0"/>
+              <a:t>(</a:t>
+            </a:r>
+            <a:r>
+              <a:rPr lang="fr-CA" dirty="0" err="1"/>
+              <a:t>A,b</a:t>
+            </a:r>
+            <a:r>
+              <a:rPr lang="fr-CA" dirty="0"/>
+              <a:t>) afin de résoudre le système et déterminer les inconnues x.</a:t>
+            </a:r>
+          </a:p>
+        </p:txBody>
+      </p:sp>
+      <p:cxnSp>
+        <p:nvCxnSpPr>
+          <p:cNvPr id="6" name="Connecteur droit avec flèche 5">
+            <a:extLst>
+              <a:ext uri="{FF2B5EF4-FFF2-40B4-BE49-F238E27FC236}">
+                <a16:creationId xmlns:a16="http://schemas.microsoft.com/office/drawing/2014/main" id="{8E7D86AC-199F-1FC6-887F-7DA87AF9BFDD}"/>
+              </a:ext>
+            </a:extLst>
+          </p:cNvPr>
+          <p:cNvCxnSpPr/>
+          <p:nvPr/>
+        </p:nvCxnSpPr>
+        <p:spPr>
+          <a:xfrm>
+            <a:off x="4354717" y="4834550"/>
+            <a:ext cx="669956" cy="597529"/>
+          </a:xfrm>
+          <a:prstGeom prst="straightConnector1">
+            <a:avLst/>
+          </a:prstGeom>
+          <a:ln>
+            <a:tailEnd type="triangle"/>
+          </a:ln>
+        </p:spPr>
+        <p:style>
+          <a:lnRef idx="2">
+            <a:schemeClr val="accent1"/>
+          </a:lnRef>
+          <a:fillRef idx="0">
+            <a:schemeClr val="accent1"/>
+          </a:fillRef>
+          <a:effectRef idx="1">
+            <a:schemeClr val="accent1"/>
+          </a:effectRef>
+          <a:fontRef idx="minor">
+            <a:schemeClr val="tx1"/>
+          </a:fontRef>
+        </p:style>
+      </p:cxnSp>
+      <p:cxnSp>
+        <p:nvCxnSpPr>
+          <p:cNvPr id="7" name="Connecteur droit avec flèche 6">
+            <a:extLst>
+              <a:ext uri="{FF2B5EF4-FFF2-40B4-BE49-F238E27FC236}">
+                <a16:creationId xmlns:a16="http://schemas.microsoft.com/office/drawing/2014/main" id="{BA218C03-0F64-A990-9AF3-717E20FFD87B}"/>
+              </a:ext>
+            </a:extLst>
+          </p:cNvPr>
+          <p:cNvCxnSpPr/>
+          <p:nvPr/>
+        </p:nvCxnSpPr>
+        <p:spPr>
+          <a:xfrm>
+            <a:off x="2344848" y="5423025"/>
+            <a:ext cx="669956" cy="597529"/>
+          </a:xfrm>
+          <a:prstGeom prst="straightConnector1">
+            <a:avLst/>
+          </a:prstGeom>
+          <a:ln>
+            <a:tailEnd type="triangle"/>
+          </a:ln>
+        </p:spPr>
+        <p:style>
+          <a:lnRef idx="2">
+            <a:schemeClr val="accent1"/>
+          </a:lnRef>
+          <a:fillRef idx="0">
+            <a:schemeClr val="accent1"/>
+          </a:fillRef>
+          <a:effectRef idx="1">
+            <a:schemeClr val="accent1"/>
+          </a:effectRef>
+          <a:fontRef idx="minor">
+            <a:schemeClr val="tx1"/>
+          </a:fontRef>
+        </p:style>
+      </p:cxnSp>
+      <p:sp>
+        <p:nvSpPr>
+          <p:cNvPr id="8" name="ZoneTexte 7">
+            <a:extLst>
+              <a:ext uri="{FF2B5EF4-FFF2-40B4-BE49-F238E27FC236}">
+                <a16:creationId xmlns:a16="http://schemas.microsoft.com/office/drawing/2014/main" id="{8688AEE6-509F-AAA1-8FCF-6A2A2C487917}"/>
+              </a:ext>
+            </a:extLst>
+          </p:cNvPr>
+          <p:cNvSpPr txBox="1"/>
+          <p:nvPr/>
+        </p:nvSpPr>
+        <p:spPr>
+          <a:xfrm>
+            <a:off x="4704782" y="5481355"/>
+            <a:ext cx="1391218" cy="646331"/>
+          </a:xfrm>
+          <a:prstGeom prst="rect">
+            <a:avLst/>
+          </a:prstGeom>
+          <a:noFill/>
+        </p:spPr>
+        <p:txBody>
+          <a:bodyPr wrap="square" rtlCol="0">
+            <a:spAutoFit/>
+          </a:bodyPr>
+          <a:lstStyle/>
+          <a:p>
+            <a:r>
+              <a:rPr lang="fr-CA" dirty="0"/>
+              <a:t>Dans la matrice A</a:t>
+            </a:r>
+          </a:p>
+        </p:txBody>
+      </p:sp>
+      <p:sp>
+        <p:nvSpPr>
+          <p:cNvPr id="9" name="ZoneTexte 8">
+            <a:extLst>
+              <a:ext uri="{FF2B5EF4-FFF2-40B4-BE49-F238E27FC236}">
+                <a16:creationId xmlns:a16="http://schemas.microsoft.com/office/drawing/2014/main" id="{C97F5669-F217-0F6C-7C21-D594C7712879}"/>
+              </a:ext>
+            </a:extLst>
+          </p:cNvPr>
+          <p:cNvSpPr txBox="1"/>
+          <p:nvPr/>
+        </p:nvSpPr>
+        <p:spPr>
+          <a:xfrm>
+            <a:off x="2963499" y="6020554"/>
+            <a:ext cx="1391218" cy="646331"/>
+          </a:xfrm>
+          <a:prstGeom prst="rect">
+            <a:avLst/>
+          </a:prstGeom>
+          <a:noFill/>
+        </p:spPr>
+        <p:txBody>
+          <a:bodyPr wrap="square" rtlCol="0">
+            <a:spAutoFit/>
+          </a:bodyPr>
+          <a:lstStyle/>
+          <a:p>
+            <a:r>
+              <a:rPr lang="fr-CA" dirty="0"/>
+              <a:t>Dans le vecteur b</a:t>
+            </a:r>
+          </a:p>
+        </p:txBody>
+      </p:sp>
     </p:spTree>
     <p:extLst>
       <p:ext uri="{BB962C8B-B14F-4D97-AF65-F5344CB8AC3E}">
@@ -9312,14 +9529,19 @@
               <a:p>
                 <a:r>
                   <a:rPr lang="fr-FR" sz="2000" dirty="0"/>
-                  <a:t>Retour sur le schéma :</a:t>
+                  <a:t>Retour sur le schéma : </a:t>
                 </a:r>
                 <a14:m>
                   <m:oMath xmlns:m="http://schemas.openxmlformats.org/officeDocument/2006/math">
                     <m:f>
                       <m:fPr>
                         <m:ctrlPr>
-                          <a:rPr lang="fr-FR" sz="2000" i="1">
+                          <a:rPr lang="fr-FR" sz="2000" i="1" smtClean="0">
+                            <a:solidFill>
+                              <a:schemeClr val="accent3">
+                                <a:lumMod val="75000"/>
+                              </a:schemeClr>
+                            </a:solidFill>
                             <a:latin typeface="Cambria Math" panose="02040503050406030204" pitchFamily="18" charset="0"/>
                           </a:rPr>
                         </m:ctrlPr>
@@ -9329,6 +9551,11 @@
                           <m:sSubPr>
                             <m:ctrlPr>
                               <a:rPr lang="fr-FR" sz="2000" i="1">
+                                <a:solidFill>
+                                  <a:schemeClr val="accent3">
+                                    <a:lumMod val="75000"/>
+                                  </a:schemeClr>
+                                </a:solidFill>
                                 <a:latin typeface="Cambria Math" panose="02040503050406030204" pitchFamily="18" charset="0"/>
                               </a:rPr>
                             </m:ctrlPr>
@@ -9336,6 +9563,11 @@
                           <m:e>
                             <m:r>
                               <a:rPr lang="fr-FR" sz="2000" i="1">
+                                <a:solidFill>
+                                  <a:schemeClr val="accent3">
+                                    <a:lumMod val="75000"/>
+                                  </a:schemeClr>
+                                </a:solidFill>
                                 <a:latin typeface="Cambria Math" panose="02040503050406030204" pitchFamily="18" charset="0"/>
                               </a:rPr>
                               <m:t>𝐶</m:t>
@@ -9344,12 +9576,22 @@
                           <m:sub>
                             <m:r>
                               <a:rPr lang="fr-FR" sz="2000" i="1">
+                                <a:solidFill>
+                                  <a:schemeClr val="accent3">
+                                    <a:lumMod val="75000"/>
+                                  </a:schemeClr>
+                                </a:solidFill>
                                 <a:latin typeface="Cambria Math" panose="02040503050406030204" pitchFamily="18" charset="0"/>
                               </a:rPr>
                               <m:t>𝑖</m:t>
                             </m:r>
                             <m:r>
                               <a:rPr lang="fr-FR" sz="2000" i="1">
+                                <a:solidFill>
+                                  <a:schemeClr val="accent3">
+                                    <a:lumMod val="75000"/>
+                                  </a:schemeClr>
+                                </a:solidFill>
                                 <a:latin typeface="Cambria Math" panose="02040503050406030204" pitchFamily="18" charset="0"/>
                               </a:rPr>
                               <m:t>+1</m:t>
@@ -9358,6 +9600,11 @@
                         </m:sSub>
                         <m:r>
                           <a:rPr lang="fr-FR" sz="2000" i="1">
+                            <a:solidFill>
+                              <a:schemeClr val="accent3">
+                                <a:lumMod val="75000"/>
+                              </a:schemeClr>
+                            </a:solidFill>
                             <a:latin typeface="Cambria Math" panose="02040503050406030204" pitchFamily="18" charset="0"/>
                           </a:rPr>
                           <m:t>−2</m:t>
@@ -9366,6 +9613,11 @@
                           <m:sSubPr>
                             <m:ctrlPr>
                               <a:rPr lang="fr-FR" sz="2000" i="1">
+                                <a:solidFill>
+                                  <a:schemeClr val="accent3">
+                                    <a:lumMod val="75000"/>
+                                  </a:schemeClr>
+                                </a:solidFill>
                                 <a:latin typeface="Cambria Math" panose="02040503050406030204" pitchFamily="18" charset="0"/>
                               </a:rPr>
                             </m:ctrlPr>
@@ -9373,6 +9625,11 @@
                           <m:e>
                             <m:r>
                               <a:rPr lang="fr-FR" sz="2000" i="1">
+                                <a:solidFill>
+                                  <a:schemeClr val="accent3">
+                                    <a:lumMod val="75000"/>
+                                  </a:schemeClr>
+                                </a:solidFill>
                                 <a:latin typeface="Cambria Math" panose="02040503050406030204" pitchFamily="18" charset="0"/>
                               </a:rPr>
                               <m:t>𝐶</m:t>
@@ -9381,6 +9638,11 @@
                           <m:sub>
                             <m:r>
                               <a:rPr lang="fr-FR" sz="2000" i="1">
+                                <a:solidFill>
+                                  <a:schemeClr val="accent3">
+                                    <a:lumMod val="75000"/>
+                                  </a:schemeClr>
+                                </a:solidFill>
                                 <a:latin typeface="Cambria Math" panose="02040503050406030204" pitchFamily="18" charset="0"/>
                               </a:rPr>
                               <m:t>𝑖</m:t>
@@ -9389,6 +9651,11 @@
                         </m:sSub>
                         <m:r>
                           <a:rPr lang="fr-FR" sz="2000" i="1">
+                            <a:solidFill>
+                              <a:schemeClr val="accent3">
+                                <a:lumMod val="75000"/>
+                              </a:schemeClr>
+                            </a:solidFill>
                             <a:latin typeface="Cambria Math" panose="02040503050406030204" pitchFamily="18" charset="0"/>
                           </a:rPr>
                           <m:t>+</m:t>
@@ -9397,6 +9664,11 @@
                           <m:sSubPr>
                             <m:ctrlPr>
                               <a:rPr lang="fr-FR" sz="2000" i="1">
+                                <a:solidFill>
+                                  <a:schemeClr val="accent3">
+                                    <a:lumMod val="75000"/>
+                                  </a:schemeClr>
+                                </a:solidFill>
                                 <a:latin typeface="Cambria Math" panose="02040503050406030204" pitchFamily="18" charset="0"/>
                               </a:rPr>
                             </m:ctrlPr>
@@ -9404,6 +9676,11 @@
                           <m:e>
                             <m:r>
                               <a:rPr lang="fr-FR" sz="2000" i="1">
+                                <a:solidFill>
+                                  <a:schemeClr val="accent3">
+                                    <a:lumMod val="75000"/>
+                                  </a:schemeClr>
+                                </a:solidFill>
                                 <a:latin typeface="Cambria Math" panose="02040503050406030204" pitchFamily="18" charset="0"/>
                               </a:rPr>
                               <m:t>𝐶</m:t>
@@ -9412,12 +9689,22 @@
                           <m:sub>
                             <m:r>
                               <a:rPr lang="fr-FR" sz="2000" i="1">
+                                <a:solidFill>
+                                  <a:schemeClr val="accent3">
+                                    <a:lumMod val="75000"/>
+                                  </a:schemeClr>
+                                </a:solidFill>
                                 <a:latin typeface="Cambria Math" panose="02040503050406030204" pitchFamily="18" charset="0"/>
                               </a:rPr>
                               <m:t>𝑖</m:t>
                             </m:r>
                             <m:r>
                               <a:rPr lang="fr-FR" sz="2000" i="1">
+                                <a:solidFill>
+                                  <a:schemeClr val="accent3">
+                                    <a:lumMod val="75000"/>
+                                  </a:schemeClr>
+                                </a:solidFill>
                                 <a:latin typeface="Cambria Math" panose="02040503050406030204" pitchFamily="18" charset="0"/>
                               </a:rPr>
                               <m:t>−1</m:t>
@@ -9431,12 +9718,22 @@
                             <m:sty m:val="p"/>
                           </m:rPr>
                           <a:rPr lang="fr-FR" sz="2000" i="1">
+                            <a:solidFill>
+                              <a:schemeClr val="accent3">
+                                <a:lumMod val="75000"/>
+                              </a:schemeClr>
+                            </a:solidFill>
                             <a:latin typeface="Cambria Math" panose="02040503050406030204" pitchFamily="18" charset="0"/>
                           </a:rPr>
                           <m:t>Δr</m:t>
                         </m:r>
                         <m:r>
                           <a:rPr lang="fr-FR" sz="2000" i="1">
+                            <a:solidFill>
+                              <a:schemeClr val="accent3">
+                                <a:lumMod val="75000"/>
+                              </a:schemeClr>
+                            </a:solidFill>
                             <a:latin typeface="Cambria Math" panose="02040503050406030204" pitchFamily="18" charset="0"/>
                           </a:rPr>
                           <m:t>²</m:t>
@@ -9450,7 +9747,12 @@
                       <m:t>+</m:t>
                     </m:r>
                     <m:r>
-                      <a:rPr lang="fr-CA" sz="2000" i="1">
+                      <a:rPr lang="fr-CA" sz="2000" i="1" smtClean="0">
+                        <a:solidFill>
+                          <a:schemeClr val="accent5">
+                            <a:lumMod val="75000"/>
+                          </a:schemeClr>
+                        </a:solidFill>
                         <a:latin typeface="Cambria Math" panose="02040503050406030204" pitchFamily="18" charset="0"/>
                       </a:rPr>
                       <m:t>𝑜</m:t>
@@ -9459,6 +9761,11 @@
                       <m:dPr>
                         <m:ctrlPr>
                           <a:rPr lang="fr-CA" sz="2000" i="1">
+                            <a:solidFill>
+                              <a:schemeClr val="accent5">
+                                <a:lumMod val="75000"/>
+                              </a:schemeClr>
+                            </a:solidFill>
                             <a:latin typeface="Cambria Math" panose="02040503050406030204" pitchFamily="18" charset="0"/>
                           </a:rPr>
                         </m:ctrlPr>
@@ -9469,6 +9776,11 @@
                             <m:sty m:val="p"/>
                           </m:rPr>
                           <a:rPr lang="fr-FR" sz="2000">
+                            <a:solidFill>
+                              <a:schemeClr val="accent5">
+                                <a:lumMod val="75000"/>
+                              </a:schemeClr>
+                            </a:solidFill>
                             <a:latin typeface="Cambria Math" panose="02040503050406030204" pitchFamily="18" charset="0"/>
                           </a:rPr>
                           <m:t>Δ</m:t>
@@ -9477,6 +9789,11 @@
                           <m:sSupPr>
                             <m:ctrlPr>
                               <a:rPr lang="fr-FR" sz="2000" i="1">
+                                <a:solidFill>
+                                  <a:schemeClr val="accent5">
+                                    <a:lumMod val="75000"/>
+                                  </a:schemeClr>
+                                </a:solidFill>
                                 <a:latin typeface="Cambria Math" panose="02040503050406030204" pitchFamily="18" charset="0"/>
                               </a:rPr>
                             </m:ctrlPr>
@@ -9484,6 +9801,11 @@
                           <m:e>
                             <m:r>
                               <a:rPr lang="fr-FR" sz="2000" i="1">
+                                <a:solidFill>
+                                  <a:schemeClr val="accent5">
+                                    <a:lumMod val="75000"/>
+                                  </a:schemeClr>
+                                </a:solidFill>
                                 <a:latin typeface="Cambria Math" panose="02040503050406030204" pitchFamily="18" charset="0"/>
                               </a:rPr>
                               <m:t>𝑟</m:t>
@@ -9492,6 +9814,11 @@
                           <m:sup>
                             <m:r>
                               <a:rPr lang="fr-CA" sz="2000" i="1">
+                                <a:solidFill>
+                                  <a:schemeClr val="accent5">
+                                    <a:lumMod val="75000"/>
+                                  </a:schemeClr>
+                                </a:solidFill>
                                 <a:latin typeface="Cambria Math" panose="02040503050406030204" pitchFamily="18" charset="0"/>
                               </a:rPr>
                               <m:t>4</m:t>
@@ -9509,7 +9836,12 @@
                     <m:f>
                       <m:fPr>
                         <m:ctrlPr>
-                          <a:rPr lang="fr-FR" sz="2000" i="1">
+                          <a:rPr lang="fr-FR" sz="2000" i="1" smtClean="0">
+                            <a:solidFill>
+                              <a:schemeClr val="accent3">
+                                <a:lumMod val="75000"/>
+                              </a:schemeClr>
+                            </a:solidFill>
                             <a:latin typeface="Cambria Math" panose="02040503050406030204" pitchFamily="18" charset="0"/>
                           </a:rPr>
                         </m:ctrlPr>
@@ -9517,6 +9849,11 @@
                       <m:num>
                         <m:r>
                           <a:rPr lang="fr-FR" sz="2000" i="1">
+                            <a:solidFill>
+                              <a:schemeClr val="accent3">
+                                <a:lumMod val="75000"/>
+                              </a:schemeClr>
+                            </a:solidFill>
                             <a:latin typeface="Cambria Math" panose="02040503050406030204" pitchFamily="18" charset="0"/>
                           </a:rPr>
                           <m:t>1</m:t>
@@ -9528,6 +9865,11 @@
                             <m:sty m:val="p"/>
                           </m:rPr>
                           <a:rPr lang="fr-FR" sz="2000" i="1">
+                            <a:solidFill>
+                              <a:schemeClr val="accent3">
+                                <a:lumMod val="75000"/>
+                              </a:schemeClr>
+                            </a:solidFill>
                             <a:latin typeface="Cambria Math" panose="02040503050406030204" pitchFamily="18" charset="0"/>
                           </a:rPr>
                           <m:t>r</m:t>
@@ -9536,6 +9878,11 @@
                     </m:f>
                     <m:r>
                       <a:rPr lang="fr-FR" sz="2000" i="1">
+                        <a:solidFill>
+                          <a:schemeClr val="accent3">
+                            <a:lumMod val="75000"/>
+                          </a:schemeClr>
+                        </a:solidFill>
                         <a:latin typeface="Cambria Math" panose="02040503050406030204" pitchFamily="18" charset="0"/>
                       </a:rPr>
                       <m:t>⋅</m:t>
@@ -9544,6 +9891,11 @@
                       <m:fPr>
                         <m:ctrlPr>
                           <a:rPr lang="fr-FR" sz="2000" i="1">
+                            <a:solidFill>
+                              <a:schemeClr val="accent3">
+                                <a:lumMod val="75000"/>
+                              </a:schemeClr>
+                            </a:solidFill>
                             <a:latin typeface="Cambria Math" panose="02040503050406030204" pitchFamily="18" charset="0"/>
                           </a:rPr>
                         </m:ctrlPr>
@@ -9553,6 +9905,11 @@
                           <m:sSubPr>
                             <m:ctrlPr>
                               <a:rPr lang="fr-FR" sz="2000" i="1">
+                                <a:solidFill>
+                                  <a:schemeClr val="accent3">
+                                    <a:lumMod val="75000"/>
+                                  </a:schemeClr>
+                                </a:solidFill>
                                 <a:latin typeface="Cambria Math" panose="02040503050406030204" pitchFamily="18" charset="0"/>
                               </a:rPr>
                             </m:ctrlPr>
@@ -9560,6 +9917,11 @@
                           <m:e>
                             <m:r>
                               <a:rPr lang="fr-FR" sz="2000" i="1">
+                                <a:solidFill>
+                                  <a:schemeClr val="accent3">
+                                    <a:lumMod val="75000"/>
+                                  </a:schemeClr>
+                                </a:solidFill>
                                 <a:latin typeface="Cambria Math" panose="02040503050406030204" pitchFamily="18" charset="0"/>
                               </a:rPr>
                               <m:t>𝐶</m:t>
@@ -9568,12 +9930,22 @@
                           <m:sub>
                             <m:r>
                               <a:rPr lang="fr-FR" sz="2000" i="1">
+                                <a:solidFill>
+                                  <a:schemeClr val="accent3">
+                                    <a:lumMod val="75000"/>
+                                  </a:schemeClr>
+                                </a:solidFill>
                                 <a:latin typeface="Cambria Math" panose="02040503050406030204" pitchFamily="18" charset="0"/>
                               </a:rPr>
                               <m:t>𝑖</m:t>
                             </m:r>
                             <m:r>
                               <a:rPr lang="fr-FR" sz="2000" i="1">
+                                <a:solidFill>
+                                  <a:schemeClr val="accent3">
+                                    <a:lumMod val="75000"/>
+                                  </a:schemeClr>
+                                </a:solidFill>
                                 <a:latin typeface="Cambria Math" panose="02040503050406030204" pitchFamily="18" charset="0"/>
                               </a:rPr>
                               <m:t>+1</m:t>
@@ -9582,6 +9954,11 @@
                         </m:sSub>
                         <m:r>
                           <a:rPr lang="fr-FR" sz="2000" i="1">
+                            <a:solidFill>
+                              <a:schemeClr val="accent3">
+                                <a:lumMod val="75000"/>
+                              </a:schemeClr>
+                            </a:solidFill>
                             <a:latin typeface="Cambria Math" panose="02040503050406030204" pitchFamily="18" charset="0"/>
                           </a:rPr>
                           <m:t>−</m:t>
@@ -9590,6 +9967,11 @@
                           <m:sSubPr>
                             <m:ctrlPr>
                               <a:rPr lang="fr-FR" sz="2000" i="1">
+                                <a:solidFill>
+                                  <a:schemeClr val="accent3">
+                                    <a:lumMod val="75000"/>
+                                  </a:schemeClr>
+                                </a:solidFill>
                                 <a:latin typeface="Cambria Math" panose="02040503050406030204" pitchFamily="18" charset="0"/>
                               </a:rPr>
                             </m:ctrlPr>
@@ -9597,6 +9979,11 @@
                           <m:e>
                             <m:r>
                               <a:rPr lang="fr-FR" sz="2000" i="1">
+                                <a:solidFill>
+                                  <a:schemeClr val="accent3">
+                                    <a:lumMod val="75000"/>
+                                  </a:schemeClr>
+                                </a:solidFill>
                                 <a:latin typeface="Cambria Math" panose="02040503050406030204" pitchFamily="18" charset="0"/>
                               </a:rPr>
                               <m:t>𝐶</m:t>
@@ -9605,6 +9992,11 @@
                           <m:sub>
                             <m:r>
                               <a:rPr lang="fr-FR" sz="2000" i="1">
+                                <a:solidFill>
+                                  <a:schemeClr val="accent3">
+                                    <a:lumMod val="75000"/>
+                                  </a:schemeClr>
+                                </a:solidFill>
                                 <a:latin typeface="Cambria Math" panose="02040503050406030204" pitchFamily="18" charset="0"/>
                               </a:rPr>
                               <m:t>𝑖</m:t>
@@ -9618,6 +10010,11 @@
                             <m:sty m:val="p"/>
                           </m:rPr>
                           <a:rPr lang="fr-FR" sz="2000" i="1">
+                            <a:solidFill>
+                              <a:schemeClr val="accent3">
+                                <a:lumMod val="75000"/>
+                              </a:schemeClr>
+                            </a:solidFill>
                             <a:latin typeface="Cambria Math" panose="02040503050406030204" pitchFamily="18" charset="0"/>
                           </a:rPr>
                           <m:t>Δr</m:t>
@@ -9630,14 +10027,267 @@
                       </a:rPr>
                       <m:t>+</m:t>
                     </m:r>
+                    <m:f>
+                      <m:fPr>
+                        <m:ctrlPr>
+                          <a:rPr lang="fr-FR" sz="2000" i="1" smtClean="0">
+                            <a:solidFill>
+                              <a:schemeClr val="accent5">
+                                <a:lumMod val="75000"/>
+                              </a:schemeClr>
+                            </a:solidFill>
+                            <a:latin typeface="Cambria Math" panose="02040503050406030204" pitchFamily="18" charset="0"/>
+                          </a:rPr>
+                        </m:ctrlPr>
+                      </m:fPr>
+                      <m:num>
+                        <m:sSup>
+                          <m:sSupPr>
+                            <m:ctrlPr>
+                              <a:rPr lang="fr-FR" sz="2000" i="1">
+                                <a:solidFill>
+                                  <a:schemeClr val="accent5">
+                                    <a:lumMod val="75000"/>
+                                  </a:schemeClr>
+                                </a:solidFill>
+                                <a:latin typeface="Cambria Math" panose="02040503050406030204" pitchFamily="18" charset="0"/>
+                              </a:rPr>
+                            </m:ctrlPr>
+                          </m:sSupPr>
+                          <m:e>
+                            <m:r>
+                              <a:rPr lang="fr-FR" sz="2000" i="1">
+                                <a:solidFill>
+                                  <a:schemeClr val="accent5">
+                                    <a:lumMod val="75000"/>
+                                  </a:schemeClr>
+                                </a:solidFill>
+                                <a:latin typeface="Cambria Math" panose="02040503050406030204" pitchFamily="18" charset="0"/>
+                              </a:rPr>
+                              <m:t>𝜕</m:t>
+                            </m:r>
+                          </m:e>
+                          <m:sup>
+                            <m:r>
+                              <a:rPr lang="fr-FR" sz="2000" i="1">
+                                <a:solidFill>
+                                  <a:schemeClr val="accent5">
+                                    <a:lumMod val="75000"/>
+                                  </a:schemeClr>
+                                </a:solidFill>
+                                <a:latin typeface="Cambria Math" panose="02040503050406030204" pitchFamily="18" charset="0"/>
+                              </a:rPr>
+                              <m:t>2</m:t>
+                            </m:r>
+                          </m:sup>
+                        </m:sSup>
+                        <m:r>
+                          <a:rPr lang="fr-FR" sz="2000" i="1">
+                            <a:solidFill>
+                              <a:schemeClr val="accent5">
+                                <a:lumMod val="75000"/>
+                              </a:schemeClr>
+                            </a:solidFill>
+                            <a:latin typeface="Cambria Math" panose="02040503050406030204" pitchFamily="18" charset="0"/>
+                          </a:rPr>
+                          <m:t>𝐶</m:t>
+                        </m:r>
+                      </m:num>
+                      <m:den>
+                        <m:r>
+                          <a:rPr lang="fr-FR" sz="2000" i="1">
+                            <a:solidFill>
+                              <a:schemeClr val="accent5">
+                                <a:lumMod val="75000"/>
+                              </a:schemeClr>
+                            </a:solidFill>
+                            <a:latin typeface="Cambria Math" panose="02040503050406030204" pitchFamily="18" charset="0"/>
+                          </a:rPr>
+                          <m:t>𝜕</m:t>
+                        </m:r>
+                        <m:sSup>
+                          <m:sSupPr>
+                            <m:ctrlPr>
+                              <a:rPr lang="fr-FR" sz="2000" i="1">
+                                <a:solidFill>
+                                  <a:schemeClr val="accent5">
+                                    <a:lumMod val="75000"/>
+                                  </a:schemeClr>
+                                </a:solidFill>
+                                <a:latin typeface="Cambria Math" panose="02040503050406030204" pitchFamily="18" charset="0"/>
+                              </a:rPr>
+                            </m:ctrlPr>
+                          </m:sSupPr>
+                          <m:e>
+                            <m:r>
+                              <a:rPr lang="fr-FR" sz="2000" i="1">
+                                <a:solidFill>
+                                  <a:schemeClr val="accent5">
+                                    <a:lumMod val="75000"/>
+                                  </a:schemeClr>
+                                </a:solidFill>
+                                <a:latin typeface="Cambria Math" panose="02040503050406030204" pitchFamily="18" charset="0"/>
+                              </a:rPr>
+                              <m:t>𝑟</m:t>
+                            </m:r>
+                          </m:e>
+                          <m:sup>
+                            <m:r>
+                              <a:rPr lang="fr-FR" sz="2000" i="1">
+                                <a:solidFill>
+                                  <a:schemeClr val="accent5">
+                                    <a:lumMod val="75000"/>
+                                  </a:schemeClr>
+                                </a:solidFill>
+                                <a:latin typeface="Cambria Math" panose="02040503050406030204" pitchFamily="18" charset="0"/>
+                              </a:rPr>
+                              <m:t>2</m:t>
+                            </m:r>
+                          </m:sup>
+                        </m:sSup>
+                      </m:den>
+                    </m:f>
+                    <m:sSub>
+                      <m:sSubPr>
+                        <m:ctrlPr>
+                          <a:rPr lang="fr-FR" sz="2000" i="1">
+                            <a:solidFill>
+                              <a:schemeClr val="accent5">
+                                <a:lumMod val="75000"/>
+                              </a:schemeClr>
+                            </a:solidFill>
+                            <a:latin typeface="Cambria Math" panose="02040503050406030204" pitchFamily="18" charset="0"/>
+                          </a:rPr>
+                        </m:ctrlPr>
+                      </m:sSubPr>
+                      <m:e>
+                        <m:d>
+                          <m:dPr>
+                            <m:begChr m:val=""/>
+                            <m:endChr m:val="|"/>
+                            <m:ctrlPr>
+                              <a:rPr lang="fr-FR" sz="2000" i="1">
+                                <a:solidFill>
+                                  <a:schemeClr val="accent5">
+                                    <a:lumMod val="75000"/>
+                                  </a:schemeClr>
+                                </a:solidFill>
+                                <a:latin typeface="Cambria Math" panose="02040503050406030204" pitchFamily="18" charset="0"/>
+                              </a:rPr>
+                            </m:ctrlPr>
+                          </m:dPr>
+                          <m:e>
+                            <m:r>
+                              <a:rPr lang="fr-FR" sz="2000" i="1">
+                                <a:solidFill>
+                                  <a:schemeClr val="accent5">
+                                    <a:lumMod val="75000"/>
+                                  </a:schemeClr>
+                                </a:solidFill>
+                                <a:latin typeface="Cambria Math" panose="02040503050406030204" pitchFamily="18" charset="0"/>
+                              </a:rPr>
+                              <m:t>​</m:t>
+                            </m:r>
+                          </m:e>
+                        </m:d>
+                      </m:e>
+                      <m:sub>
+                        <m:r>
+                          <a:rPr lang="fr-FR" sz="2000" i="1">
+                            <a:solidFill>
+                              <a:schemeClr val="accent5">
+                                <a:lumMod val="75000"/>
+                              </a:schemeClr>
+                            </a:solidFill>
+                            <a:latin typeface="Cambria Math" panose="02040503050406030204" pitchFamily="18" charset="0"/>
+                          </a:rPr>
+                          <m:t>𝑖</m:t>
+                        </m:r>
+                      </m:sub>
+                    </m:sSub>
+                    <m:f>
+                      <m:fPr>
+                        <m:ctrlPr>
+                          <a:rPr lang="fr-FR" sz="2000" i="1">
+                            <a:solidFill>
+                              <a:schemeClr val="accent5">
+                                <a:lumMod val="75000"/>
+                              </a:schemeClr>
+                            </a:solidFill>
+                            <a:latin typeface="Cambria Math" panose="02040503050406030204" pitchFamily="18" charset="0"/>
+                          </a:rPr>
+                        </m:ctrlPr>
+                      </m:fPr>
+                      <m:num>
+                        <m:r>
+                          <m:rPr>
+                            <m:sty m:val="p"/>
+                          </m:rPr>
+                          <a:rPr lang="fr-FR" sz="2000" i="1">
+                            <a:solidFill>
+                              <a:schemeClr val="accent5">
+                                <a:lumMod val="75000"/>
+                              </a:schemeClr>
+                            </a:solidFill>
+                            <a:latin typeface="Cambria Math" panose="02040503050406030204" pitchFamily="18" charset="0"/>
+                          </a:rPr>
+                          <m:t>Δ</m:t>
+                        </m:r>
+                        <m:r>
+                          <a:rPr lang="fr-CA" sz="2000" i="1">
+                            <a:solidFill>
+                              <a:schemeClr val="accent5">
+                                <a:lumMod val="75000"/>
+                              </a:schemeClr>
+                            </a:solidFill>
+                            <a:latin typeface="Cambria Math" panose="02040503050406030204" pitchFamily="18" charset="0"/>
+                          </a:rPr>
+                          <m:t>𝑟</m:t>
+                        </m:r>
+                      </m:num>
+                      <m:den>
+                        <m:r>
+                          <a:rPr lang="fr-FR" sz="2000" i="1">
+                            <a:solidFill>
+                              <a:schemeClr val="accent5">
+                                <a:lumMod val="75000"/>
+                              </a:schemeClr>
+                            </a:solidFill>
+                            <a:latin typeface="Cambria Math" panose="02040503050406030204" pitchFamily="18" charset="0"/>
+                          </a:rPr>
+                          <m:t>2!</m:t>
+                        </m:r>
+                      </m:den>
+                    </m:f>
+                    <m:r>
+                      <a:rPr lang="fr-CA" sz="2000" b="0" i="1" smtClean="0">
+                        <a:solidFill>
+                          <a:schemeClr val="accent5">
+                            <a:lumMod val="75000"/>
+                          </a:schemeClr>
+                        </a:solidFill>
+                        <a:latin typeface="Cambria Math" panose="02040503050406030204" pitchFamily="18" charset="0"/>
+                      </a:rPr>
+                      <m:t>+</m:t>
+                    </m:r>
                     <m:r>
                       <a:rPr lang="fr-CA" sz="2000" i="1">
+                        <a:solidFill>
+                          <a:schemeClr val="accent5">
+                            <a:lumMod val="75000"/>
+                          </a:schemeClr>
+                        </a:solidFill>
                         <a:latin typeface="Cambria Math" panose="02040503050406030204" pitchFamily="18" charset="0"/>
                       </a:rPr>
                       <m:t>𝑜</m:t>
                     </m:r>
                     <m:r>
                       <a:rPr lang="fr-CA" sz="2000" i="1">
+                        <a:solidFill>
+                          <a:schemeClr val="accent5">
+                            <a:lumMod val="75000"/>
+                          </a:schemeClr>
+                        </a:solidFill>
                         <a:latin typeface="Cambria Math" panose="02040503050406030204" pitchFamily="18" charset="0"/>
                       </a:rPr>
                       <m:t>(</m:t>
@@ -9647,6 +10297,11 @@
                         <m:sty m:val="p"/>
                       </m:rPr>
                       <a:rPr lang="fr-FR" sz="2000">
+                        <a:solidFill>
+                          <a:schemeClr val="accent5">
+                            <a:lumMod val="75000"/>
+                          </a:schemeClr>
+                        </a:solidFill>
                         <a:latin typeface="Cambria Math" panose="02040503050406030204" pitchFamily="18" charset="0"/>
                       </a:rPr>
                       <m:t>Δ</m:t>
@@ -9655,6 +10310,11 @@
                       <m:sSupPr>
                         <m:ctrlPr>
                           <a:rPr lang="fr-FR" sz="2000" i="1">
+                            <a:solidFill>
+                              <a:schemeClr val="accent5">
+                                <a:lumMod val="75000"/>
+                              </a:schemeClr>
+                            </a:solidFill>
                             <a:latin typeface="Cambria Math" panose="02040503050406030204" pitchFamily="18" charset="0"/>
                           </a:rPr>
                         </m:ctrlPr>
@@ -9662,6 +10322,11 @@
                       <m:e>
                         <m:r>
                           <a:rPr lang="fr-FR" sz="2000" i="1">
+                            <a:solidFill>
+                              <a:schemeClr val="accent5">
+                                <a:lumMod val="75000"/>
+                              </a:schemeClr>
+                            </a:solidFill>
                             <a:latin typeface="Cambria Math" panose="02040503050406030204" pitchFamily="18" charset="0"/>
                           </a:rPr>
                           <m:t>𝑟</m:t>
@@ -9670,6 +10335,11 @@
                       <m:sup>
                         <m:r>
                           <a:rPr lang="fr-CA" sz="2000" b="0" i="1" smtClean="0">
+                            <a:solidFill>
+                              <a:schemeClr val="accent5">
+                                <a:lumMod val="75000"/>
+                              </a:schemeClr>
+                            </a:solidFill>
                             <a:latin typeface="Cambria Math" panose="02040503050406030204" pitchFamily="18" charset="0"/>
                           </a:rPr>
                           <m:t>2</m:t>
@@ -9678,13 +10348,24 @@
                     </m:sSup>
                     <m:r>
                       <a:rPr lang="fr-CA" sz="2000" i="1">
+                        <a:solidFill>
+                          <a:schemeClr val="accent5">
+                            <a:lumMod val="75000"/>
+                          </a:schemeClr>
+                        </a:solidFill>
                         <a:latin typeface="Cambria Math" panose="02040503050406030204" pitchFamily="18" charset="0"/>
                       </a:rPr>
                       <m:t>)</m:t>
                     </m:r>
                   </m:oMath>
                 </a14:m>
-                <a:endParaRPr lang="fr-FR" sz="2000" dirty="0"/>
+                <a:endParaRPr lang="fr-FR" sz="2000" dirty="0">
+                  <a:solidFill>
+                    <a:schemeClr val="accent5">
+                      <a:lumMod val="75000"/>
+                    </a:schemeClr>
+                  </a:solidFill>
+                </a:endParaRPr>
               </a:p>
               <a:p>
                 <a14:m>
@@ -9744,81 +10425,148 @@
                       <m:fPr>
                         <m:ctrlPr>
                           <a:rPr lang="fr-FR" sz="2000" b="0" i="1" dirty="0" smtClean="0">
+                            <a:solidFill>
+                              <a:schemeClr val="accent3">
+                                <a:lumMod val="75000"/>
+                              </a:schemeClr>
+                            </a:solidFill>
                             <a:latin typeface="Cambria Math" panose="02040503050406030204" pitchFamily="18" charset="0"/>
                           </a:rPr>
                         </m:ctrlPr>
                       </m:fPr>
                       <m:num>
-                        <m:sSup>
-                          <m:sSupPr>
+                        <m:sSub>
+                          <m:sSubPr>
                             <m:ctrlPr>
                               <a:rPr lang="fr-FR" sz="2000" b="0" i="1" dirty="0" smtClean="0">
+                                <a:solidFill>
+                                  <a:schemeClr val="accent3">
+                                    <a:lumMod val="75000"/>
+                                  </a:schemeClr>
+                                </a:solidFill>
                                 <a:latin typeface="Cambria Math" panose="02040503050406030204" pitchFamily="18" charset="0"/>
                               </a:rPr>
                             </m:ctrlPr>
-                          </m:sSupPr>
+                          </m:sSubPr>
                           <m:e>
                             <m:r>
                               <a:rPr lang="fr-FR" sz="2000" b="0" i="1" dirty="0" smtClean="0">
-                                <a:latin typeface="Cambria Math" panose="02040503050406030204" pitchFamily="18" charset="0"/>
-                              </a:rPr>
-                              <m:t>𝜕</m:t>
+                                <a:solidFill>
+                                  <a:schemeClr val="accent3">
+                                    <a:lumMod val="75000"/>
+                                  </a:schemeClr>
+                                </a:solidFill>
+                                <a:latin typeface="Cambria Math" panose="02040503050406030204" pitchFamily="18" charset="0"/>
+                              </a:rPr>
+                              <m:t>𝐷</m:t>
                             </m:r>
                           </m:e>
-                          <m:sup>
+                          <m:sub>
                             <m:r>
                               <a:rPr lang="fr-FR" sz="2000" b="0" i="1" dirty="0" smtClean="0">
-                                <a:latin typeface="Cambria Math" panose="02040503050406030204" pitchFamily="18" charset="0"/>
-                              </a:rPr>
-                              <m:t>2</m:t>
-                            </m:r>
-                          </m:sup>
-                        </m:sSup>
-                        <m:r>
-                          <a:rPr lang="fr-FR" sz="2000" b="0" i="1" dirty="0" smtClean="0">
-                            <a:latin typeface="Cambria Math" panose="02040503050406030204" pitchFamily="18" charset="0"/>
-                          </a:rPr>
-                          <m:t>𝐶</m:t>
-                        </m:r>
+                                <a:solidFill>
+                                  <a:schemeClr val="accent3">
+                                    <a:lumMod val="75000"/>
+                                  </a:schemeClr>
+                                </a:solidFill>
+                                <a:latin typeface="Cambria Math" panose="02040503050406030204" pitchFamily="18" charset="0"/>
+                              </a:rPr>
+                              <m:t>𝑒𝑓𝑓</m:t>
+                            </m:r>
+                          </m:sub>
+                        </m:sSub>
                       </m:num>
                       <m:den>
                         <m:r>
                           <a:rPr lang="fr-FR" sz="2000" b="0" i="1" dirty="0" smtClean="0">
+                            <a:solidFill>
+                              <a:schemeClr val="accent3">
+                                <a:lumMod val="75000"/>
+                              </a:schemeClr>
+                            </a:solidFill>
+                            <a:latin typeface="Cambria Math" panose="02040503050406030204" pitchFamily="18" charset="0"/>
+                          </a:rPr>
+                          <m:t>𝑟</m:t>
+                        </m:r>
+                      </m:den>
+                    </m:f>
+                    <m:f>
+                      <m:fPr>
+                        <m:ctrlPr>
+                          <a:rPr lang="fr-FR" sz="2000" b="0" i="1" dirty="0" smtClean="0">
+                            <a:solidFill>
+                              <a:schemeClr val="accent3">
+                                <a:lumMod val="75000"/>
+                              </a:schemeClr>
+                            </a:solidFill>
+                            <a:latin typeface="Cambria Math" panose="02040503050406030204" pitchFamily="18" charset="0"/>
+                          </a:rPr>
+                        </m:ctrlPr>
+                      </m:fPr>
+                      <m:num>
+                        <m:r>
+                          <a:rPr lang="fr-FR" sz="2000" b="0" i="1" dirty="0" smtClean="0">
+                            <a:solidFill>
+                              <a:schemeClr val="accent3">
+                                <a:lumMod val="75000"/>
+                              </a:schemeClr>
+                            </a:solidFill>
                             <a:latin typeface="Cambria Math" panose="02040503050406030204" pitchFamily="18" charset="0"/>
                           </a:rPr>
                           <m:t>𝜕</m:t>
                         </m:r>
-                        <m:sSup>
-                          <m:sSupPr>
-                            <m:ctrlPr>
-                              <a:rPr lang="fr-FR" sz="2000" b="0" i="1" dirty="0" smtClean="0">
-                                <a:latin typeface="Cambria Math" panose="02040503050406030204" pitchFamily="18" charset="0"/>
-                              </a:rPr>
-                            </m:ctrlPr>
-                          </m:sSupPr>
-                          <m:e>
-                            <m:r>
-                              <a:rPr lang="fr-FR" sz="2000" b="0" i="1" dirty="0" smtClean="0">
-                                <a:latin typeface="Cambria Math" panose="02040503050406030204" pitchFamily="18" charset="0"/>
-                              </a:rPr>
-                              <m:t>𝑟</m:t>
-                            </m:r>
-                          </m:e>
-                          <m:sup>
-                            <m:r>
-                              <a:rPr lang="fr-FR" sz="2000" b="0" i="1" dirty="0" smtClean="0">
-                                <a:latin typeface="Cambria Math" panose="02040503050406030204" pitchFamily="18" charset="0"/>
-                              </a:rPr>
-                              <m:t>2</m:t>
-                            </m:r>
-                          </m:sup>
-                        </m:sSup>
+                        <m:r>
+                          <m:rPr>
+                            <m:sty m:val="p"/>
+                          </m:rPr>
+                          <a:rPr lang="fr-FR" sz="2000" b="0" i="1" dirty="0" smtClean="0">
+                            <a:solidFill>
+                              <a:schemeClr val="accent3">
+                                <a:lumMod val="75000"/>
+                              </a:schemeClr>
+                            </a:solidFill>
+                            <a:latin typeface="Cambria Math" panose="02040503050406030204" pitchFamily="18" charset="0"/>
+                          </a:rPr>
+                          <m:t>C</m:t>
+                        </m:r>
+                      </m:num>
+                      <m:den>
+                        <m:r>
+                          <a:rPr lang="fr-FR" sz="2000" b="0" i="1" dirty="0" smtClean="0">
+                            <a:solidFill>
+                              <a:schemeClr val="accent3">
+                                <a:lumMod val="75000"/>
+                              </a:schemeClr>
+                            </a:solidFill>
+                            <a:latin typeface="Cambria Math" panose="02040503050406030204" pitchFamily="18" charset="0"/>
+                          </a:rPr>
+                          <m:t>𝜕</m:t>
+                        </m:r>
+                        <m:r>
+                          <m:rPr>
+                            <m:sty m:val="p"/>
+                          </m:rPr>
+                          <a:rPr lang="fr-FR" sz="2000" b="0" i="1" dirty="0" smtClean="0">
+                            <a:solidFill>
+                              <a:schemeClr val="accent3">
+                                <a:lumMod val="75000"/>
+                              </a:schemeClr>
+                            </a:solidFill>
+                            <a:latin typeface="Cambria Math" panose="02040503050406030204" pitchFamily="18" charset="0"/>
+                          </a:rPr>
+                          <m:t>r</m:t>
+                        </m:r>
                       </m:den>
                     </m:f>
                     <m:sSub>
                       <m:sSubPr>
                         <m:ctrlPr>
                           <a:rPr lang="fr-FR" sz="2000" b="0" i="1" dirty="0" smtClean="0">
+                            <a:solidFill>
+                              <a:schemeClr val="accent3">
+                                <a:lumMod val="75000"/>
+                              </a:schemeClr>
+                            </a:solidFill>
                             <a:latin typeface="Cambria Math" panose="02040503050406030204" pitchFamily="18" charset="0"/>
                           </a:rPr>
                         </m:ctrlPr>
@@ -9830,6 +10578,11 @@
                             <m:endChr m:val="|"/>
                             <m:ctrlPr>
                               <a:rPr lang="fr-FR" sz="2000" b="0" i="1" dirty="0" smtClean="0">
+                                <a:solidFill>
+                                  <a:schemeClr val="accent3">
+                                    <a:lumMod val="75000"/>
+                                  </a:schemeClr>
+                                </a:solidFill>
                                 <a:latin typeface="Cambria Math" panose="02040503050406030204" pitchFamily="18" charset="0"/>
                               </a:rPr>
                             </m:ctrlPr>
@@ -9837,6 +10590,11 @@
                           <m:e>
                             <m:r>
                               <a:rPr lang="fr-FR" sz="2000" b="0" i="1" dirty="0" smtClean="0">
+                                <a:solidFill>
+                                  <a:schemeClr val="accent3">
+                                    <a:lumMod val="75000"/>
+                                  </a:schemeClr>
+                                </a:solidFill>
                                 <a:latin typeface="Cambria Math" panose="02040503050406030204" pitchFamily="18" charset="0"/>
                               </a:rPr>
                               <m:t>​</m:t>
@@ -9847,6 +10605,11 @@
                       <m:sub>
                         <m:r>
                           <a:rPr lang="fr-FR" sz="2000" b="0" i="1" dirty="0" smtClean="0">
+                            <a:solidFill>
+                              <a:schemeClr val="accent3">
+                                <a:lumMod val="75000"/>
+                              </a:schemeClr>
+                            </a:solidFill>
                             <a:latin typeface="Cambria Math" panose="02040503050406030204" pitchFamily="18" charset="0"/>
                           </a:rPr>
                           <m:t>𝑖</m:t>
@@ -9854,7 +10617,37 @@
                       </m:sub>
                     </m:sSub>
                     <m:r>
+                      <m:rPr>
+                        <m:sty m:val="p"/>
+                      </m:rPr>
+                      <a:rPr lang="fr-FR" sz="2000" b="0" i="0" dirty="0" smtClean="0">
+                        <a:solidFill>
+                          <a:schemeClr val="accent3">
+                            <a:lumMod val="75000"/>
+                          </a:schemeClr>
+                        </a:solidFill>
+                        <a:latin typeface="Cambria Math" panose="02040503050406030204" pitchFamily="18" charset="0"/>
+                      </a:rPr>
+                      <m:t>Δ</m:t>
+                    </m:r>
+                    <m:r>
                       <a:rPr lang="fr-FR" sz="2000" b="0" i="1" dirty="0" smtClean="0">
+                        <a:solidFill>
+                          <a:schemeClr val="accent3">
+                            <a:lumMod val="75000"/>
+                          </a:schemeClr>
+                        </a:solidFill>
+                        <a:latin typeface="Cambria Math" panose="02040503050406030204" pitchFamily="18" charset="0"/>
+                      </a:rPr>
+                      <m:t>𝑟</m:t>
+                    </m:r>
+                    <m:r>
+                      <a:rPr lang="fr-FR" sz="2000" b="0" i="1" dirty="0" smtClean="0">
+                        <a:solidFill>
+                          <a:schemeClr val="accent3">
+                            <a:lumMod val="75000"/>
+                          </a:schemeClr>
+                        </a:solidFill>
                         <a:latin typeface="Cambria Math" panose="02040503050406030204" pitchFamily="18" charset="0"/>
                       </a:rPr>
                       <m:t>+</m:t>
@@ -9863,6 +10656,11 @@
                       <m:fPr>
                         <m:ctrlPr>
                           <a:rPr lang="fr-FR" sz="2000" b="0" i="1" dirty="0" smtClean="0">
+                            <a:solidFill>
+                              <a:schemeClr val="accent3">
+                                <a:lumMod val="75000"/>
+                              </a:schemeClr>
+                            </a:solidFill>
                             <a:latin typeface="Cambria Math" panose="02040503050406030204" pitchFamily="18" charset="0"/>
                           </a:rPr>
                         </m:ctrlPr>
@@ -9872,6 +10670,11 @@
                           <m:sSubPr>
                             <m:ctrlPr>
                               <a:rPr lang="fr-FR" sz="2000" b="0" i="1" dirty="0" smtClean="0">
+                                <a:solidFill>
+                                  <a:schemeClr val="accent3">
+                                    <a:lumMod val="75000"/>
+                                  </a:schemeClr>
+                                </a:solidFill>
                                 <a:latin typeface="Cambria Math" panose="02040503050406030204" pitchFamily="18" charset="0"/>
                               </a:rPr>
                             </m:ctrlPr>
@@ -9879,6 +10682,11 @@
                           <m:e>
                             <m:r>
                               <a:rPr lang="fr-FR" sz="2000" b="0" i="1" dirty="0" smtClean="0">
+                                <a:solidFill>
+                                  <a:schemeClr val="accent3">
+                                    <a:lumMod val="75000"/>
+                                  </a:schemeClr>
+                                </a:solidFill>
                                 <a:latin typeface="Cambria Math" panose="02040503050406030204" pitchFamily="18" charset="0"/>
                               </a:rPr>
                               <m:t>𝐷</m:t>
@@ -9887,6 +10695,11 @@
                           <m:sub>
                             <m:r>
                               <a:rPr lang="fr-FR" sz="2000" b="0" i="1" dirty="0" smtClean="0">
+                                <a:solidFill>
+                                  <a:schemeClr val="accent3">
+                                    <a:lumMod val="75000"/>
+                                  </a:schemeClr>
+                                </a:solidFill>
                                 <a:latin typeface="Cambria Math" panose="02040503050406030204" pitchFamily="18" charset="0"/>
                               </a:rPr>
                               <m:t>𝑒𝑓𝑓</m:t>
@@ -9897,6 +10710,22 @@
                       <m:den>
                         <m:r>
                           <a:rPr lang="fr-FR" sz="2000" b="0" i="1" dirty="0" smtClean="0">
+                            <a:solidFill>
+                              <a:schemeClr val="accent3">
+                                <a:lumMod val="75000"/>
+                              </a:schemeClr>
+                            </a:solidFill>
+                            <a:latin typeface="Cambria Math" panose="02040503050406030204" pitchFamily="18" charset="0"/>
+                          </a:rPr>
+                          <m:t>2</m:t>
+                        </m:r>
+                        <m:r>
+                          <a:rPr lang="fr-FR" sz="2000" b="0" i="1" dirty="0" smtClean="0">
+                            <a:solidFill>
+                              <a:schemeClr val="accent3">
+                                <a:lumMod val="75000"/>
+                              </a:schemeClr>
+                            </a:solidFill>
                             <a:latin typeface="Cambria Math" panose="02040503050406030204" pitchFamily="18" charset="0"/>
                           </a:rPr>
                           <m:t>𝑟</m:t>
@@ -9907,49 +10736,131 @@
                       <m:fPr>
                         <m:ctrlPr>
                           <a:rPr lang="fr-FR" sz="2000" b="0" i="1" dirty="0" smtClean="0">
+                            <a:solidFill>
+                              <a:schemeClr val="accent3">
+                                <a:lumMod val="75000"/>
+                              </a:schemeClr>
+                            </a:solidFill>
                             <a:latin typeface="Cambria Math" panose="02040503050406030204" pitchFamily="18" charset="0"/>
                           </a:rPr>
                         </m:ctrlPr>
                       </m:fPr>
                       <m:num>
+                        <m:sSup>
+                          <m:sSupPr>
+                            <m:ctrlPr>
+                              <a:rPr lang="fr-FR" sz="2000" b="0" i="1" dirty="0" smtClean="0">
+                                <a:solidFill>
+                                  <a:schemeClr val="accent3">
+                                    <a:lumMod val="75000"/>
+                                  </a:schemeClr>
+                                </a:solidFill>
+                                <a:latin typeface="Cambria Math" panose="02040503050406030204" pitchFamily="18" charset="0"/>
+                              </a:rPr>
+                            </m:ctrlPr>
+                          </m:sSupPr>
+                          <m:e>
+                            <m:r>
+                              <a:rPr lang="fr-FR" sz="2000" b="0" i="1" dirty="0" smtClean="0">
+                                <a:solidFill>
+                                  <a:schemeClr val="accent3">
+                                    <a:lumMod val="75000"/>
+                                  </a:schemeClr>
+                                </a:solidFill>
+                                <a:latin typeface="Cambria Math" panose="02040503050406030204" pitchFamily="18" charset="0"/>
+                              </a:rPr>
+                              <m:t>𝜕</m:t>
+                            </m:r>
+                          </m:e>
+                          <m:sup>
+                            <m:r>
+                              <a:rPr lang="fr-FR" sz="2000" b="0" i="1" dirty="0" smtClean="0">
+                                <a:solidFill>
+                                  <a:schemeClr val="accent3">
+                                    <a:lumMod val="75000"/>
+                                  </a:schemeClr>
+                                </a:solidFill>
+                                <a:latin typeface="Cambria Math" panose="02040503050406030204" pitchFamily="18" charset="0"/>
+                              </a:rPr>
+                              <m:t>2</m:t>
+                            </m:r>
+                          </m:sup>
+                        </m:sSup>
                         <m:r>
                           <a:rPr lang="fr-FR" sz="2000" b="0" i="1" dirty="0" smtClean="0">
-                            <a:latin typeface="Cambria Math" panose="02040503050406030204" pitchFamily="18" charset="0"/>
-                          </a:rPr>
-                          <m:t>𝜕</m:t>
-                        </m:r>
-                        <m:r>
-                          <m:rPr>
-                            <m:sty m:val="p"/>
-                          </m:rPr>
-                          <a:rPr lang="fr-FR" sz="2000" b="0" i="1" dirty="0" smtClean="0">
-                            <a:latin typeface="Cambria Math" panose="02040503050406030204" pitchFamily="18" charset="0"/>
-                          </a:rPr>
-                          <m:t>C</m:t>
+                            <a:solidFill>
+                              <a:schemeClr val="accent3">
+                                <a:lumMod val="75000"/>
+                              </a:schemeClr>
+                            </a:solidFill>
+                            <a:latin typeface="Cambria Math" panose="02040503050406030204" pitchFamily="18" charset="0"/>
+                          </a:rPr>
+                          <m:t>𝐶</m:t>
                         </m:r>
                       </m:num>
                       <m:den>
                         <m:r>
                           <a:rPr lang="fr-FR" sz="2000" b="0" i="1" dirty="0" smtClean="0">
+                            <a:solidFill>
+                              <a:schemeClr val="accent3">
+                                <a:lumMod val="75000"/>
+                              </a:schemeClr>
+                            </a:solidFill>
                             <a:latin typeface="Cambria Math" panose="02040503050406030204" pitchFamily="18" charset="0"/>
                           </a:rPr>
                           <m:t>𝜕</m:t>
                         </m:r>
-                        <m:r>
-                          <m:rPr>
-                            <m:sty m:val="p"/>
-                          </m:rPr>
-                          <a:rPr lang="fr-FR" sz="2000" b="0" i="1" dirty="0" smtClean="0">
-                            <a:latin typeface="Cambria Math" panose="02040503050406030204" pitchFamily="18" charset="0"/>
-                          </a:rPr>
-                          <m:t>r</m:t>
-                        </m:r>
+                        <m:sSup>
+                          <m:sSupPr>
+                            <m:ctrlPr>
+                              <a:rPr lang="fr-FR" sz="2000" b="0" i="1" dirty="0" smtClean="0">
+                                <a:solidFill>
+                                  <a:schemeClr val="accent3">
+                                    <a:lumMod val="75000"/>
+                                  </a:schemeClr>
+                                </a:solidFill>
+                                <a:latin typeface="Cambria Math" panose="02040503050406030204" pitchFamily="18" charset="0"/>
+                              </a:rPr>
+                            </m:ctrlPr>
+                          </m:sSupPr>
+                          <m:e>
+                            <m:r>
+                              <a:rPr lang="fr-FR" sz="2000" b="0" i="1" dirty="0" smtClean="0">
+                                <a:solidFill>
+                                  <a:schemeClr val="accent3">
+                                    <a:lumMod val="75000"/>
+                                  </a:schemeClr>
+                                </a:solidFill>
+                                <a:latin typeface="Cambria Math" panose="02040503050406030204" pitchFamily="18" charset="0"/>
+                              </a:rPr>
+                              <m:t>𝑟</m:t>
+                            </m:r>
+                          </m:e>
+                          <m:sup>
+                            <m:r>
+                              <a:rPr lang="fr-FR" sz="2000" b="0" i="1" dirty="0" smtClean="0">
+                                <a:solidFill>
+                                  <a:schemeClr val="accent3">
+                                    <a:lumMod val="75000"/>
+                                  </a:schemeClr>
+                                </a:solidFill>
+                                <a:latin typeface="Cambria Math" panose="02040503050406030204" pitchFamily="18" charset="0"/>
+                              </a:rPr>
+                              <m:t>2</m:t>
+                            </m:r>
+                          </m:sup>
+                        </m:sSup>
                       </m:den>
                     </m:f>
                     <m:sSub>
                       <m:sSubPr>
                         <m:ctrlPr>
                           <a:rPr lang="fr-FR" sz="2000" b="0" i="1" dirty="0" smtClean="0">
+                            <a:solidFill>
+                              <a:schemeClr val="accent3">
+                                <a:lumMod val="75000"/>
+                              </a:schemeClr>
+                            </a:solidFill>
                             <a:latin typeface="Cambria Math" panose="02040503050406030204" pitchFamily="18" charset="0"/>
                           </a:rPr>
                         </m:ctrlPr>
@@ -9961,6 +10872,11 @@
                             <m:endChr m:val="|"/>
                             <m:ctrlPr>
                               <a:rPr lang="fr-FR" sz="2000" b="0" i="1" dirty="0" smtClean="0">
+                                <a:solidFill>
+                                  <a:schemeClr val="accent3">
+                                    <a:lumMod val="75000"/>
+                                  </a:schemeClr>
+                                </a:solidFill>
                                 <a:latin typeface="Cambria Math" panose="02040503050406030204" pitchFamily="18" charset="0"/>
                               </a:rPr>
                             </m:ctrlPr>
@@ -9968,6 +10884,11 @@
                           <m:e>
                             <m:r>
                               <a:rPr lang="fr-FR" sz="2000" b="0" i="1" dirty="0" smtClean="0">
+                                <a:solidFill>
+                                  <a:schemeClr val="accent3">
+                                    <a:lumMod val="75000"/>
+                                  </a:schemeClr>
+                                </a:solidFill>
                                 <a:latin typeface="Cambria Math" panose="02040503050406030204" pitchFamily="18" charset="0"/>
                               </a:rPr>
                               <m:t>​</m:t>
@@ -9978,6 +10899,11 @@
                       <m:sub>
                         <m:r>
                           <a:rPr lang="fr-FR" sz="2000" b="0" i="1" dirty="0" smtClean="0">
+                            <a:solidFill>
+                              <a:schemeClr val="accent3">
+                                <a:lumMod val="75000"/>
+                              </a:schemeClr>
+                            </a:solidFill>
                             <a:latin typeface="Cambria Math" panose="02040503050406030204" pitchFamily="18" charset="0"/>
                           </a:rPr>
                           <m:t>𝑖</m:t>
@@ -9989,18 +10915,60 @@
                         <m:sty m:val="p"/>
                       </m:rPr>
                       <a:rPr lang="fr-FR" sz="2000" b="0" i="0" dirty="0" smtClean="0">
+                        <a:solidFill>
+                          <a:schemeClr val="accent3">
+                            <a:lumMod val="75000"/>
+                          </a:schemeClr>
+                        </a:solidFill>
                         <a:latin typeface="Cambria Math" panose="02040503050406030204" pitchFamily="18" charset="0"/>
                       </a:rPr>
                       <m:t>Δ</m:t>
                     </m:r>
+                    <m:sSup>
+                      <m:sSupPr>
+                        <m:ctrlPr>
+                          <a:rPr lang="fr-FR" sz="2000" b="0" i="1" dirty="0" smtClean="0">
+                            <a:solidFill>
+                              <a:schemeClr val="accent3">
+                                <a:lumMod val="75000"/>
+                              </a:schemeClr>
+                            </a:solidFill>
+                            <a:latin typeface="Cambria Math" panose="02040503050406030204" pitchFamily="18" charset="0"/>
+                          </a:rPr>
+                        </m:ctrlPr>
+                      </m:sSupPr>
+                      <m:e>
+                        <m:r>
+                          <a:rPr lang="fr-FR" sz="2000" b="0" i="1" dirty="0" smtClean="0">
+                            <a:solidFill>
+                              <a:schemeClr val="accent3">
+                                <a:lumMod val="75000"/>
+                              </a:schemeClr>
+                            </a:solidFill>
+                            <a:latin typeface="Cambria Math" panose="02040503050406030204" pitchFamily="18" charset="0"/>
+                          </a:rPr>
+                          <m:t>𝑟</m:t>
+                        </m:r>
+                      </m:e>
+                      <m:sup>
+                        <m:r>
+                          <a:rPr lang="fr-FR" sz="2000" b="0" i="1" dirty="0" smtClean="0">
+                            <a:solidFill>
+                              <a:schemeClr val="accent3">
+                                <a:lumMod val="75000"/>
+                              </a:schemeClr>
+                            </a:solidFill>
+                            <a:latin typeface="Cambria Math" panose="02040503050406030204" pitchFamily="18" charset="0"/>
+                          </a:rPr>
+                          <m:t>2</m:t>
+                        </m:r>
+                      </m:sup>
+                    </m:sSup>
                     <m:r>
-                      <a:rPr lang="fr-FR" sz="2000" b="0" i="1" dirty="0" smtClean="0">
-                        <a:latin typeface="Cambria Math" panose="02040503050406030204" pitchFamily="18" charset="0"/>
-                      </a:rPr>
-                      <m:t>𝑟</m:t>
-                    </m:r>
-                    <m:r>
-                      <a:rPr lang="fr-FR" sz="2000" b="0" i="1" dirty="0" smtClean="0">
+                      <a:rPr lang="fr-CA" sz="2000" b="0" i="1" dirty="0" smtClean="0">
+                        <a:solidFill>
+                          <a:schemeClr val="tx1"/>
+                        </a:solidFill>
                         <a:latin typeface="Cambria Math" panose="02040503050406030204" pitchFamily="18" charset="0"/>
                       </a:rPr>
                       <m:t>+</m:t>
@@ -10008,57 +10976,12 @@
                     <m:f>
                       <m:fPr>
                         <m:ctrlPr>
-                          <a:rPr lang="fr-FR" sz="2000" b="0" i="1" dirty="0" smtClean="0">
-                            <a:latin typeface="Cambria Math" panose="02040503050406030204" pitchFamily="18" charset="0"/>
-                          </a:rPr>
-                        </m:ctrlPr>
-                      </m:fPr>
-                      <m:num>
-                        <m:sSub>
-                          <m:sSubPr>
-                            <m:ctrlPr>
-                              <a:rPr lang="fr-FR" sz="2000" b="0" i="1" dirty="0" smtClean="0">
-                                <a:latin typeface="Cambria Math" panose="02040503050406030204" pitchFamily="18" charset="0"/>
-                              </a:rPr>
-                            </m:ctrlPr>
-                          </m:sSubPr>
-                          <m:e>
-                            <m:r>
-                              <a:rPr lang="fr-FR" sz="2000" b="0" i="1" dirty="0" smtClean="0">
-                                <a:latin typeface="Cambria Math" panose="02040503050406030204" pitchFamily="18" charset="0"/>
-                              </a:rPr>
-                              <m:t>𝐷</m:t>
-                            </m:r>
-                          </m:e>
-                          <m:sub>
-                            <m:r>
-                              <a:rPr lang="fr-FR" sz="2000" b="0" i="1" dirty="0" smtClean="0">
-                                <a:latin typeface="Cambria Math" panose="02040503050406030204" pitchFamily="18" charset="0"/>
-                              </a:rPr>
-                              <m:t>𝑒𝑓𝑓</m:t>
-                            </m:r>
-                          </m:sub>
-                        </m:sSub>
-                      </m:num>
-                      <m:den>
-                        <m:r>
-                          <a:rPr lang="fr-FR" sz="2000" b="0" i="1" dirty="0" smtClean="0">
-                            <a:latin typeface="Cambria Math" panose="02040503050406030204" pitchFamily="18" charset="0"/>
-                          </a:rPr>
-                          <m:t>2</m:t>
-                        </m:r>
-                        <m:r>
-                          <a:rPr lang="fr-FR" sz="2000" b="0" i="1" dirty="0" smtClean="0">
-                            <a:latin typeface="Cambria Math" panose="02040503050406030204" pitchFamily="18" charset="0"/>
-                          </a:rPr>
-                          <m:t>𝑟</m:t>
-                        </m:r>
-                      </m:den>
-                    </m:f>
-                    <m:f>
-                      <m:fPr>
-                        <m:ctrlPr>
-                          <a:rPr lang="fr-FR" sz="2000" b="0" i="1" dirty="0" smtClean="0">
+                          <a:rPr lang="fr-FR" sz="2000" i="1" smtClean="0">
+                            <a:solidFill>
+                              <a:schemeClr val="accent5">
+                                <a:lumMod val="75000"/>
+                              </a:schemeClr>
+                            </a:solidFill>
                             <a:latin typeface="Cambria Math" panose="02040503050406030204" pitchFamily="18" charset="0"/>
                           </a:rPr>
                         </m:ctrlPr>
@@ -10067,14 +10990,24 @@
                         <m:sSup>
                           <m:sSupPr>
                             <m:ctrlPr>
-                              <a:rPr lang="fr-FR" sz="2000" b="0" i="1" dirty="0" smtClean="0">
+                              <a:rPr lang="fr-FR" sz="2000" i="1">
+                                <a:solidFill>
+                                  <a:schemeClr val="accent5">
+                                    <a:lumMod val="75000"/>
+                                  </a:schemeClr>
+                                </a:solidFill>
                                 <a:latin typeface="Cambria Math" panose="02040503050406030204" pitchFamily="18" charset="0"/>
                               </a:rPr>
                             </m:ctrlPr>
                           </m:sSupPr>
                           <m:e>
                             <m:r>
-                              <a:rPr lang="fr-FR" sz="2000" b="0" i="1" dirty="0" smtClean="0">
+                              <a:rPr lang="fr-FR" sz="2000" i="1">
+                                <a:solidFill>
+                                  <a:schemeClr val="accent5">
+                                    <a:lumMod val="75000"/>
+                                  </a:schemeClr>
+                                </a:solidFill>
                                 <a:latin typeface="Cambria Math" panose="02040503050406030204" pitchFamily="18" charset="0"/>
                               </a:rPr>
                               <m:t>𝜕</m:t>
@@ -10082,7 +11015,12 @@
                           </m:e>
                           <m:sup>
                             <m:r>
-                              <a:rPr lang="fr-FR" sz="2000" b="0" i="1" dirty="0" smtClean="0">
+                              <a:rPr lang="fr-FR" sz="2000" i="1">
+                                <a:solidFill>
+                                  <a:schemeClr val="accent5">
+                                    <a:lumMod val="75000"/>
+                                  </a:schemeClr>
+                                </a:solidFill>
                                 <a:latin typeface="Cambria Math" panose="02040503050406030204" pitchFamily="18" charset="0"/>
                               </a:rPr>
                               <m:t>2</m:t>
@@ -10090,7 +11028,12 @@
                           </m:sup>
                         </m:sSup>
                         <m:r>
-                          <a:rPr lang="fr-FR" sz="2000" b="0" i="1" dirty="0" smtClean="0">
+                          <a:rPr lang="fr-FR" sz="2000" i="1">
+                            <a:solidFill>
+                              <a:schemeClr val="accent5">
+                                <a:lumMod val="75000"/>
+                              </a:schemeClr>
+                            </a:solidFill>
                             <a:latin typeface="Cambria Math" panose="02040503050406030204" pitchFamily="18" charset="0"/>
                           </a:rPr>
                           <m:t>𝐶</m:t>
@@ -10098,7 +11041,12 @@
                       </m:num>
                       <m:den>
                         <m:r>
-                          <a:rPr lang="fr-FR" sz="2000" b="0" i="1" dirty="0" smtClean="0">
+                          <a:rPr lang="fr-FR" sz="2000" i="1">
+                            <a:solidFill>
+                              <a:schemeClr val="accent5">
+                                <a:lumMod val="75000"/>
+                              </a:schemeClr>
+                            </a:solidFill>
                             <a:latin typeface="Cambria Math" panose="02040503050406030204" pitchFamily="18" charset="0"/>
                           </a:rPr>
                           <m:t>𝜕</m:t>
@@ -10106,14 +11054,24 @@
                         <m:sSup>
                           <m:sSupPr>
                             <m:ctrlPr>
-                              <a:rPr lang="fr-FR" sz="2000" b="0" i="1" dirty="0" smtClean="0">
+                              <a:rPr lang="fr-FR" sz="2000" i="1">
+                                <a:solidFill>
+                                  <a:schemeClr val="accent5">
+                                    <a:lumMod val="75000"/>
+                                  </a:schemeClr>
+                                </a:solidFill>
                                 <a:latin typeface="Cambria Math" panose="02040503050406030204" pitchFamily="18" charset="0"/>
                               </a:rPr>
                             </m:ctrlPr>
                           </m:sSupPr>
                           <m:e>
                             <m:r>
-                              <a:rPr lang="fr-FR" sz="2000" b="0" i="1" dirty="0" smtClean="0">
+                              <a:rPr lang="fr-FR" sz="2000" i="1">
+                                <a:solidFill>
+                                  <a:schemeClr val="accent5">
+                                    <a:lumMod val="75000"/>
+                                  </a:schemeClr>
+                                </a:solidFill>
                                 <a:latin typeface="Cambria Math" panose="02040503050406030204" pitchFamily="18" charset="0"/>
                               </a:rPr>
                               <m:t>𝑟</m:t>
@@ -10121,7 +11079,12 @@
                           </m:e>
                           <m:sup>
                             <m:r>
-                              <a:rPr lang="fr-FR" sz="2000" b="0" i="1" dirty="0" smtClean="0">
+                              <a:rPr lang="fr-FR" sz="2000" i="1">
+                                <a:solidFill>
+                                  <a:schemeClr val="accent5">
+                                    <a:lumMod val="75000"/>
+                                  </a:schemeClr>
+                                </a:solidFill>
                                 <a:latin typeface="Cambria Math" panose="02040503050406030204" pitchFamily="18" charset="0"/>
                               </a:rPr>
                               <m:t>2</m:t>
@@ -10133,7 +11096,12 @@
                     <m:sSub>
                       <m:sSubPr>
                         <m:ctrlPr>
-                          <a:rPr lang="fr-FR" sz="2000" b="0" i="1" dirty="0" smtClean="0">
+                          <a:rPr lang="fr-FR" sz="2000" i="1">
+                            <a:solidFill>
+                              <a:schemeClr val="accent5">
+                                <a:lumMod val="75000"/>
+                              </a:schemeClr>
+                            </a:solidFill>
                             <a:latin typeface="Cambria Math" panose="02040503050406030204" pitchFamily="18" charset="0"/>
                           </a:rPr>
                         </m:ctrlPr>
@@ -10144,14 +11112,24 @@
                             <m:begChr m:val=""/>
                             <m:endChr m:val="|"/>
                             <m:ctrlPr>
-                              <a:rPr lang="fr-FR" sz="2000" b="0" i="1" dirty="0" smtClean="0">
+                              <a:rPr lang="fr-FR" sz="2000" i="1">
+                                <a:solidFill>
+                                  <a:schemeClr val="accent5">
+                                    <a:lumMod val="75000"/>
+                                  </a:schemeClr>
+                                </a:solidFill>
                                 <a:latin typeface="Cambria Math" panose="02040503050406030204" pitchFamily="18" charset="0"/>
                               </a:rPr>
                             </m:ctrlPr>
                           </m:dPr>
                           <m:e>
                             <m:r>
-                              <a:rPr lang="fr-FR" sz="2000" b="0" i="1" dirty="0" smtClean="0">
+                              <a:rPr lang="fr-FR" sz="2000" i="1">
+                                <a:solidFill>
+                                  <a:schemeClr val="accent5">
+                                    <a:lumMod val="75000"/>
+                                  </a:schemeClr>
+                                </a:solidFill>
                                 <a:latin typeface="Cambria Math" panose="02040503050406030204" pitchFamily="18" charset="0"/>
                               </a:rPr>
                               <m:t>​</m:t>
@@ -10161,55 +11139,182 @@
                       </m:e>
                       <m:sub>
                         <m:r>
-                          <a:rPr lang="fr-FR" sz="2000" b="0" i="1" dirty="0" smtClean="0">
+                          <a:rPr lang="fr-FR" sz="2000" i="1">
+                            <a:solidFill>
+                              <a:schemeClr val="accent5">
+                                <a:lumMod val="75000"/>
+                              </a:schemeClr>
+                            </a:solidFill>
                             <a:latin typeface="Cambria Math" panose="02040503050406030204" pitchFamily="18" charset="0"/>
                           </a:rPr>
                           <m:t>𝑖</m:t>
                         </m:r>
                       </m:sub>
                     </m:sSub>
+                    <m:f>
+                      <m:fPr>
+                        <m:ctrlPr>
+                          <a:rPr lang="fr-FR" sz="2000" i="1">
+                            <a:solidFill>
+                              <a:schemeClr val="accent5">
+                                <a:lumMod val="75000"/>
+                              </a:schemeClr>
+                            </a:solidFill>
+                            <a:latin typeface="Cambria Math" panose="02040503050406030204" pitchFamily="18" charset="0"/>
+                          </a:rPr>
+                        </m:ctrlPr>
+                      </m:fPr>
+                      <m:num>
+                        <m:r>
+                          <m:rPr>
+                            <m:sty m:val="p"/>
+                          </m:rPr>
+                          <a:rPr lang="fr-FR" sz="2000" i="1">
+                            <a:solidFill>
+                              <a:schemeClr val="accent5">
+                                <a:lumMod val="75000"/>
+                              </a:schemeClr>
+                            </a:solidFill>
+                            <a:latin typeface="Cambria Math" panose="02040503050406030204" pitchFamily="18" charset="0"/>
+                          </a:rPr>
+                          <m:t>Δ</m:t>
+                        </m:r>
+                        <m:r>
+                          <a:rPr lang="fr-CA" sz="2000" i="1">
+                            <a:solidFill>
+                              <a:schemeClr val="accent5">
+                                <a:lumMod val="75000"/>
+                              </a:schemeClr>
+                            </a:solidFill>
+                            <a:latin typeface="Cambria Math" panose="02040503050406030204" pitchFamily="18" charset="0"/>
+                          </a:rPr>
+                          <m:t>𝑟</m:t>
+                        </m:r>
+                      </m:num>
+                      <m:den>
+                        <m:r>
+                          <a:rPr lang="fr-FR" sz="2000" i="1">
+                            <a:solidFill>
+                              <a:schemeClr val="accent5">
+                                <a:lumMod val="75000"/>
+                              </a:schemeClr>
+                            </a:solidFill>
+                            <a:latin typeface="Cambria Math" panose="02040503050406030204" pitchFamily="18" charset="0"/>
+                          </a:rPr>
+                          <m:t>2!</m:t>
+                        </m:r>
+                      </m:den>
+                    </m:f>
                     <m:r>
-                      <m:rPr>
-                        <m:sty m:val="p"/>
-                      </m:rPr>
-                      <a:rPr lang="fr-FR" sz="2000" b="0" i="0" dirty="0" smtClean="0">
+                      <a:rPr lang="fr-CA" sz="2000" b="0" i="1" dirty="0" smtClean="0">
+                        <a:solidFill>
+                          <a:schemeClr val="accent5">
+                            <a:lumMod val="75000"/>
+                          </a:schemeClr>
+                        </a:solidFill>
                         <a:latin typeface="Cambria Math" panose="02040503050406030204" pitchFamily="18" charset="0"/>
                       </a:rPr>
-                      <m:t>Δ</m:t>
+                      <m:t>+</m:t>
                     </m:r>
-                    <m:sSup>
-                      <m:sSupPr>
+                    <m:r>
+                      <a:rPr lang="fr-CA" sz="2000" i="1">
+                        <a:solidFill>
+                          <a:schemeClr val="accent5">
+                            <a:lumMod val="75000"/>
+                          </a:schemeClr>
+                        </a:solidFill>
+                        <a:latin typeface="Cambria Math" panose="02040503050406030204" pitchFamily="18" charset="0"/>
+                      </a:rPr>
+                      <m:t>𝑜</m:t>
+                    </m:r>
+                    <m:d>
+                      <m:dPr>
                         <m:ctrlPr>
-                          <a:rPr lang="fr-FR" sz="2000" b="0" i="1" dirty="0" smtClean="0">
+                          <a:rPr lang="fr-CA" sz="2000" i="1">
+                            <a:solidFill>
+                              <a:schemeClr val="accent5">
+                                <a:lumMod val="75000"/>
+                              </a:schemeClr>
+                            </a:solidFill>
                             <a:latin typeface="Cambria Math" panose="02040503050406030204" pitchFamily="18" charset="0"/>
                           </a:rPr>
                         </m:ctrlPr>
-                      </m:sSupPr>
+                      </m:dPr>
                       <m:e>
                         <m:r>
-                          <a:rPr lang="fr-FR" sz="2000" b="0" i="1" dirty="0" smtClean="0">
-                            <a:latin typeface="Cambria Math" panose="02040503050406030204" pitchFamily="18" charset="0"/>
-                          </a:rPr>
-                          <m:t>𝑟</m:t>
-                        </m:r>
+                          <m:rPr>
+                            <m:sty m:val="p"/>
+                          </m:rPr>
+                          <a:rPr lang="fr-FR" sz="2000">
+                            <a:solidFill>
+                              <a:schemeClr val="accent5">
+                                <a:lumMod val="75000"/>
+                              </a:schemeClr>
+                            </a:solidFill>
+                            <a:latin typeface="Cambria Math" panose="02040503050406030204" pitchFamily="18" charset="0"/>
+                          </a:rPr>
+                          <m:t>Δ</m:t>
+                        </m:r>
+                        <m:sSup>
+                          <m:sSupPr>
+                            <m:ctrlPr>
+                              <a:rPr lang="fr-FR" sz="2000" i="1">
+                                <a:solidFill>
+                                  <a:schemeClr val="accent5">
+                                    <a:lumMod val="75000"/>
+                                  </a:schemeClr>
+                                </a:solidFill>
+                                <a:latin typeface="Cambria Math" panose="02040503050406030204" pitchFamily="18" charset="0"/>
+                              </a:rPr>
+                            </m:ctrlPr>
+                          </m:sSupPr>
+                          <m:e>
+                            <m:r>
+                              <a:rPr lang="fr-FR" sz="2000" i="1">
+                                <a:solidFill>
+                                  <a:schemeClr val="accent5">
+                                    <a:lumMod val="75000"/>
+                                  </a:schemeClr>
+                                </a:solidFill>
+                                <a:latin typeface="Cambria Math" panose="02040503050406030204" pitchFamily="18" charset="0"/>
+                              </a:rPr>
+                              <m:t>𝑟</m:t>
+                            </m:r>
+                          </m:e>
+                          <m:sup>
+                            <m:r>
+                              <a:rPr lang="fr-CA" sz="2000" b="0" i="1" smtClean="0">
+                                <a:solidFill>
+                                  <a:schemeClr val="accent5">
+                                    <a:lumMod val="75000"/>
+                                  </a:schemeClr>
+                                </a:solidFill>
+                                <a:latin typeface="Cambria Math" panose="02040503050406030204" pitchFamily="18" charset="0"/>
+                              </a:rPr>
+                              <m:t>2</m:t>
+                            </m:r>
+                          </m:sup>
+                        </m:sSup>
                       </m:e>
-                      <m:sup>
-                        <m:r>
-                          <a:rPr lang="fr-FR" sz="2000" b="0" i="1" dirty="0" smtClean="0">
-                            <a:latin typeface="Cambria Math" panose="02040503050406030204" pitchFamily="18" charset="0"/>
-                          </a:rPr>
-                          <m:t>2</m:t>
-                        </m:r>
-                      </m:sup>
-                    </m:sSup>
+                    </m:d>
                     <m:r>
                       <a:rPr lang="fr-FR" sz="2000" b="0" i="1" dirty="0" smtClean="0">
+                        <a:solidFill>
+                          <a:schemeClr val="accent5">
+                            <a:lumMod val="75000"/>
+                          </a:schemeClr>
+                        </a:solidFill>
                         <a:latin typeface="Cambria Math" panose="02040503050406030204" pitchFamily="18" charset="0"/>
                       </a:rPr>
                       <m:t>+</m:t>
                     </m:r>
                     <m:r>
                       <a:rPr lang="fr-FR" sz="2000" b="0" i="1" dirty="0" smtClean="0">
+                        <a:solidFill>
+                          <a:schemeClr val="accent5">
+                            <a:lumMod val="75000"/>
+                          </a:schemeClr>
+                        </a:solidFill>
                         <a:latin typeface="Cambria Math" panose="02040503050406030204" pitchFamily="18" charset="0"/>
                       </a:rPr>
                       <m:t>𝑜</m:t>
@@ -10218,6 +11323,11 @@
                       <m:dPr>
                         <m:ctrlPr>
                           <a:rPr lang="fr-FR" sz="2000" b="0" i="1" dirty="0" smtClean="0">
+                            <a:solidFill>
+                              <a:schemeClr val="accent5">
+                                <a:lumMod val="75000"/>
+                              </a:schemeClr>
+                            </a:solidFill>
                             <a:latin typeface="Cambria Math" panose="02040503050406030204" pitchFamily="18" charset="0"/>
                           </a:rPr>
                         </m:ctrlPr>
@@ -10228,6 +11338,11 @@
                             <m:sty m:val="p"/>
                           </m:rPr>
                           <a:rPr lang="fr-FR" sz="2000" b="0" i="0" dirty="0" smtClean="0">
+                            <a:solidFill>
+                              <a:schemeClr val="accent5">
+                                <a:lumMod val="75000"/>
+                              </a:schemeClr>
+                            </a:solidFill>
                             <a:latin typeface="Cambria Math" panose="02040503050406030204" pitchFamily="18" charset="0"/>
                           </a:rPr>
                           <m:t>Δ</m:t>
@@ -10236,6 +11351,11 @@
                           <m:sSupPr>
                             <m:ctrlPr>
                               <a:rPr lang="fr-FR" sz="2000" b="0" i="1" dirty="0" smtClean="0">
+                                <a:solidFill>
+                                  <a:schemeClr val="accent5">
+                                    <a:lumMod val="75000"/>
+                                  </a:schemeClr>
+                                </a:solidFill>
                                 <a:latin typeface="Cambria Math" panose="02040503050406030204" pitchFamily="18" charset="0"/>
                               </a:rPr>
                             </m:ctrlPr>
@@ -10243,6 +11363,11 @@
                           <m:e>
                             <m:r>
                               <a:rPr lang="fr-FR" sz="2000" b="0" i="1" dirty="0" smtClean="0">
+                                <a:solidFill>
+                                  <a:schemeClr val="accent5">
+                                    <a:lumMod val="75000"/>
+                                  </a:schemeClr>
+                                </a:solidFill>
                                 <a:latin typeface="Cambria Math" panose="02040503050406030204" pitchFamily="18" charset="0"/>
                               </a:rPr>
                               <m:t>𝑟</m:t>
@@ -10250,10 +11375,15 @@
                           </m:e>
                           <m:sup>
                             <m:r>
-                              <a:rPr lang="fr-FR" sz="2000" b="0" i="1" dirty="0" smtClean="0">
-                                <a:latin typeface="Cambria Math" panose="02040503050406030204" pitchFamily="18" charset="0"/>
-                              </a:rPr>
-                              <m:t>3</m:t>
+                              <a:rPr lang="fr-CA" sz="2000" b="0" i="1" dirty="0" smtClean="0">
+                                <a:solidFill>
+                                  <a:schemeClr val="accent5">
+                                    <a:lumMod val="75000"/>
+                                  </a:schemeClr>
+                                </a:solidFill>
+                                <a:latin typeface="Cambria Math" panose="02040503050406030204" pitchFamily="18" charset="0"/>
+                              </a:rPr>
+                              <m:t>4</m:t>
                             </m:r>
                           </m:sup>
                         </m:sSup>
@@ -10266,266 +11396,87 @@
                 </a:endParaRPr>
               </a:p>
               <a:p>
+                <a:pPr marL="0" indent="0">
+                  <a:buNone/>
+                </a:pPr>
+                <a:r>
+                  <a:rPr lang="en-US" sz="2000" dirty="0">
+                    <a:latin typeface="Cambria Math" panose="02040503050406030204" pitchFamily="18" charset="0"/>
+                  </a:rPr>
+                  <a:t>                                             </a:t>
+                </a:r>
+                <a:r>
+                  <a:rPr lang="en-US" sz="2000" dirty="0">
+                    <a:solidFill>
+                      <a:schemeClr val="accent3">
+                        <a:lumMod val="75000"/>
+                      </a:schemeClr>
+                    </a:solidFill>
+                    <a:latin typeface="Cambria Math" panose="02040503050406030204" pitchFamily="18" charset="0"/>
+                  </a:rPr>
+                  <a:t>L(C)                                 </a:t>
+                </a:r>
                 <a:r>
                   <a:rPr lang="en-US" sz="2000" dirty="0" err="1">
+                    <a:solidFill>
+                      <a:schemeClr val="accent5">
+                        <a:lumMod val="75000"/>
+                      </a:schemeClr>
+                    </a:solidFill>
                     <a:latin typeface="Cambria Math" panose="02040503050406030204" pitchFamily="18" charset="0"/>
                   </a:rPr>
                   <a:t>Erreur</a:t>
                 </a:r>
                 <a:r>
                   <a:rPr lang="en-US" sz="2000" i="1" dirty="0">
+                    <a:solidFill>
+                      <a:schemeClr val="accent5">
+                        <a:lumMod val="75000"/>
+                      </a:schemeClr>
+                    </a:solidFill>
                     <a:latin typeface="Cambria Math" panose="02040503050406030204" pitchFamily="18" charset="0"/>
                   </a:rPr>
                   <a:t> </a:t>
                 </a:r>
                 <a:r>
                   <a:rPr lang="en-US" sz="2000" dirty="0">
+                    <a:solidFill>
+                      <a:schemeClr val="accent5">
+                        <a:lumMod val="75000"/>
+                      </a:schemeClr>
+                    </a:solidFill>
                     <a:latin typeface="Cambria Math" panose="02040503050406030204" pitchFamily="18" charset="0"/>
                   </a:rPr>
                   <a:t>de</a:t>
                 </a:r>
                 <a:r>
                   <a:rPr lang="en-US" sz="2000" i="1" dirty="0">
+                    <a:solidFill>
+                      <a:schemeClr val="accent5">
+                        <a:lumMod val="75000"/>
+                      </a:schemeClr>
+                    </a:solidFill>
                     <a:latin typeface="Cambria Math" panose="02040503050406030204" pitchFamily="18" charset="0"/>
                   </a:rPr>
                   <a:t> </a:t>
                 </a:r>
                 <a:r>
                   <a:rPr lang="en-US" sz="2000" dirty="0" err="1">
+                    <a:solidFill>
+                      <a:schemeClr val="accent5">
+                        <a:lumMod val="75000"/>
+                      </a:schemeClr>
+                    </a:solidFill>
                     <a:latin typeface="Cambria Math" panose="02040503050406030204" pitchFamily="18" charset="0"/>
                   </a:rPr>
                   <a:t>troncature</a:t>
                 </a:r>
-                <a:r>
-                  <a:rPr lang="en-US" sz="2000" dirty="0">
-                    <a:latin typeface="Cambria Math" panose="02040503050406030204" pitchFamily="18" charset="0"/>
-                  </a:rPr>
-                  <a:t> : </a:t>
-                </a:r>
-                <a14:m>
-                  <m:oMath xmlns:m="http://schemas.openxmlformats.org/officeDocument/2006/math">
-                    <m:f>
-                      <m:fPr>
-                        <m:ctrlPr>
-                          <a:rPr lang="fr-FR" sz="2000" i="1" dirty="0">
-                            <a:latin typeface="Cambria Math" panose="02040503050406030204" pitchFamily="18" charset="0"/>
-                          </a:rPr>
-                        </m:ctrlPr>
-                      </m:fPr>
-                      <m:num>
-                        <m:r>
-                          <a:rPr lang="fr-FR" sz="2000" b="0" i="1" dirty="0" smtClean="0">
-                            <a:latin typeface="Cambria Math" panose="02040503050406030204" pitchFamily="18" charset="0"/>
-                          </a:rPr>
-                          <m:t>1</m:t>
-                        </m:r>
-                      </m:num>
-                      <m:den>
-                        <m:r>
-                          <a:rPr lang="fr-FR" sz="2000" i="1" dirty="0">
-                            <a:latin typeface="Cambria Math" panose="02040503050406030204" pitchFamily="18" charset="0"/>
-                          </a:rPr>
-                          <m:t>2</m:t>
-                        </m:r>
-                        <m:r>
-                          <a:rPr lang="fr-FR" sz="2000" i="1" dirty="0">
-                            <a:latin typeface="Cambria Math" panose="02040503050406030204" pitchFamily="18" charset="0"/>
-                          </a:rPr>
-                          <m:t>𝑟</m:t>
-                        </m:r>
-                      </m:den>
-                    </m:f>
-                    <m:f>
-                      <m:fPr>
-                        <m:ctrlPr>
-                          <a:rPr lang="fr-FR" sz="2000" i="1" dirty="0">
-                            <a:latin typeface="Cambria Math" panose="02040503050406030204" pitchFamily="18" charset="0"/>
-                          </a:rPr>
-                        </m:ctrlPr>
-                      </m:fPr>
-                      <m:num>
-                        <m:sSup>
-                          <m:sSupPr>
-                            <m:ctrlPr>
-                              <a:rPr lang="fr-FR" sz="2000" i="1" dirty="0">
-                                <a:latin typeface="Cambria Math" panose="02040503050406030204" pitchFamily="18" charset="0"/>
-                              </a:rPr>
-                            </m:ctrlPr>
-                          </m:sSupPr>
-                          <m:e>
-                            <m:r>
-                              <a:rPr lang="fr-FR" sz="2000" i="1" dirty="0">
-                                <a:latin typeface="Cambria Math" panose="02040503050406030204" pitchFamily="18" charset="0"/>
-                              </a:rPr>
-                              <m:t>𝜕</m:t>
-                            </m:r>
-                          </m:e>
-                          <m:sup>
-                            <m:r>
-                              <a:rPr lang="fr-FR" sz="2000" i="1" dirty="0">
-                                <a:latin typeface="Cambria Math" panose="02040503050406030204" pitchFamily="18" charset="0"/>
-                              </a:rPr>
-                              <m:t>2</m:t>
-                            </m:r>
-                          </m:sup>
-                        </m:sSup>
-                        <m:r>
-                          <a:rPr lang="fr-FR" sz="2000" i="1" dirty="0">
-                            <a:latin typeface="Cambria Math" panose="02040503050406030204" pitchFamily="18" charset="0"/>
-                          </a:rPr>
-                          <m:t>𝐶</m:t>
-                        </m:r>
-                      </m:num>
-                      <m:den>
-                        <m:r>
-                          <a:rPr lang="fr-FR" sz="2000" i="1" dirty="0">
-                            <a:latin typeface="Cambria Math" panose="02040503050406030204" pitchFamily="18" charset="0"/>
-                          </a:rPr>
-                          <m:t>𝜕</m:t>
-                        </m:r>
-                        <m:sSup>
-                          <m:sSupPr>
-                            <m:ctrlPr>
-                              <a:rPr lang="fr-FR" sz="2000" i="1" dirty="0">
-                                <a:latin typeface="Cambria Math" panose="02040503050406030204" pitchFamily="18" charset="0"/>
-                              </a:rPr>
-                            </m:ctrlPr>
-                          </m:sSupPr>
-                          <m:e>
-                            <m:r>
-                              <a:rPr lang="fr-FR" sz="2000" i="1" dirty="0">
-                                <a:latin typeface="Cambria Math" panose="02040503050406030204" pitchFamily="18" charset="0"/>
-                              </a:rPr>
-                              <m:t>𝑟</m:t>
-                            </m:r>
-                          </m:e>
-                          <m:sup>
-                            <m:r>
-                              <a:rPr lang="fr-FR" sz="2000" i="1" dirty="0">
-                                <a:latin typeface="Cambria Math" panose="02040503050406030204" pitchFamily="18" charset="0"/>
-                              </a:rPr>
-                              <m:t>2</m:t>
-                            </m:r>
-                          </m:sup>
-                        </m:sSup>
-                      </m:den>
-                    </m:f>
-                    <m:sSub>
-                      <m:sSubPr>
-                        <m:ctrlPr>
-                          <a:rPr lang="fr-FR" sz="2000" i="1" dirty="0">
-                            <a:latin typeface="Cambria Math" panose="02040503050406030204" pitchFamily="18" charset="0"/>
-                          </a:rPr>
-                        </m:ctrlPr>
-                      </m:sSubPr>
-                      <m:e>
-                        <m:d>
-                          <m:dPr>
-                            <m:begChr m:val=""/>
-                            <m:endChr m:val="|"/>
-                            <m:ctrlPr>
-                              <a:rPr lang="fr-FR" sz="2000" i="1" dirty="0">
-                                <a:latin typeface="Cambria Math" panose="02040503050406030204" pitchFamily="18" charset="0"/>
-                              </a:rPr>
-                            </m:ctrlPr>
-                          </m:dPr>
-                          <m:e>
-                            <m:r>
-                              <a:rPr lang="fr-FR" sz="2000" i="1" dirty="0">
-                                <a:latin typeface="Cambria Math" panose="02040503050406030204" pitchFamily="18" charset="0"/>
-                              </a:rPr>
-                              <m:t>​</m:t>
-                            </m:r>
-                          </m:e>
-                        </m:d>
-                      </m:e>
-                      <m:sub>
-                        <m:r>
-                          <a:rPr lang="fr-FR" sz="2000" i="1" dirty="0">
-                            <a:latin typeface="Cambria Math" panose="02040503050406030204" pitchFamily="18" charset="0"/>
-                          </a:rPr>
-                          <m:t>𝑖</m:t>
-                        </m:r>
-                      </m:sub>
-                    </m:sSub>
-                    <m:r>
-                      <m:rPr>
-                        <m:sty m:val="p"/>
-                      </m:rPr>
-                      <a:rPr lang="fr-FR" sz="2000" dirty="0">
-                        <a:latin typeface="Cambria Math" panose="02040503050406030204" pitchFamily="18" charset="0"/>
-                      </a:rPr>
-                      <m:t>Δ</m:t>
-                    </m:r>
-                    <m:r>
-                      <m:rPr>
-                        <m:sty m:val="p"/>
-                      </m:rPr>
-                      <a:rPr lang="fr-FR" sz="2000" b="0" i="1" dirty="0" smtClean="0">
-                        <a:latin typeface="Cambria Math" panose="02040503050406030204" pitchFamily="18" charset="0"/>
-                      </a:rPr>
-                      <m:t>r</m:t>
-                    </m:r>
-                    <m:r>
-                      <a:rPr lang="fr-FR" sz="2000" i="1" dirty="0">
-                        <a:latin typeface="Cambria Math" panose="02040503050406030204" pitchFamily="18" charset="0"/>
-                      </a:rPr>
-                      <m:t>+</m:t>
-                    </m:r>
-                    <m:r>
-                      <a:rPr lang="fr-FR" sz="2000" i="1" dirty="0">
-                        <a:latin typeface="Cambria Math" panose="02040503050406030204" pitchFamily="18" charset="0"/>
-                      </a:rPr>
-                      <m:t>𝑜</m:t>
-                    </m:r>
-                    <m:d>
-                      <m:dPr>
-                        <m:ctrlPr>
-                          <a:rPr lang="fr-FR" sz="2000" i="1" dirty="0">
-                            <a:latin typeface="Cambria Math" panose="02040503050406030204" pitchFamily="18" charset="0"/>
-                          </a:rPr>
-                        </m:ctrlPr>
-                      </m:dPr>
-                      <m:e>
-                        <m:r>
-                          <m:rPr>
-                            <m:sty m:val="p"/>
-                          </m:rPr>
-                          <a:rPr lang="fr-FR" sz="2000" dirty="0">
-                            <a:latin typeface="Cambria Math" panose="02040503050406030204" pitchFamily="18" charset="0"/>
-                          </a:rPr>
-                          <m:t>Δ</m:t>
-                        </m:r>
-                        <m:sSup>
-                          <m:sSupPr>
-                            <m:ctrlPr>
-                              <a:rPr lang="fr-FR" sz="2000" i="1" dirty="0">
-                                <a:latin typeface="Cambria Math" panose="02040503050406030204" pitchFamily="18" charset="0"/>
-                              </a:rPr>
-                            </m:ctrlPr>
-                          </m:sSupPr>
-                          <m:e>
-                            <m:r>
-                              <a:rPr lang="fr-FR" sz="2000" i="1" dirty="0">
-                                <a:latin typeface="Cambria Math" panose="02040503050406030204" pitchFamily="18" charset="0"/>
-                              </a:rPr>
-                              <m:t>𝑟</m:t>
-                            </m:r>
-                          </m:e>
-                          <m:sup>
-                            <m:r>
-                              <a:rPr lang="fr-FR" sz="2000" i="1" dirty="0">
-                                <a:latin typeface="Cambria Math" panose="02040503050406030204" pitchFamily="18" charset="0"/>
-                              </a:rPr>
-                              <m:t>3</m:t>
-                            </m:r>
-                          </m:sup>
-                        </m:sSup>
-                      </m:e>
-                    </m:d>
-                  </m:oMath>
-                </a14:m>
                 <a:endParaRPr lang="en-US" sz="2000" dirty="0">
+                  <a:solidFill>
+                    <a:schemeClr val="accent5">
+                      <a:lumMod val="75000"/>
+                    </a:schemeClr>
+                  </a:solidFill>
                   <a:latin typeface="Cambria Math" panose="02040503050406030204" pitchFamily="18" charset="0"/>
                 </a:endParaRPr>
               </a:p>

</xml_diff>

<commit_message>
Ajout des slides d'analyse des graphs
</commit_message>
<xml_diff>
--- a/MEC8211-Devoir1.pptx
+++ b/MEC8211-Devoir1.pptx
@@ -13,7 +13,7 @@
     <p:sldId id="263" r:id="rId7"/>
     <p:sldId id="261" r:id="rId8"/>
     <p:sldId id="265" r:id="rId9"/>
-    <p:sldId id="267" r:id="rId10"/>
+    <p:sldId id="269" r:id="rId10"/>
   </p:sldIdLst>
   <p:sldSz cx="12192000" cy="6858000"/>
   <p:notesSz cx="6858000" cy="9144000"/>
@@ -11765,7 +11765,7 @@
           <a:p>
             <a:r>
               <a:rPr lang="fr-FR" dirty="0"/>
-              <a:t>F. Résultats</a:t>
+              <a:t>F. Résultats et analyse - Avant</a:t>
             </a:r>
             <a:endParaRPr lang="en-US" dirty="0"/>
           </a:p>
@@ -11785,8 +11785,8 @@
         </p:nvSpPr>
         <p:spPr>
           <a:xfrm>
-            <a:off x="1140737" y="4934139"/>
-            <a:ext cx="10520126" cy="1754326"/>
+            <a:off x="1068310" y="4746447"/>
+            <a:ext cx="10520126" cy="1815882"/>
           </a:xfrm>
           <a:prstGeom prst="rect">
             <a:avLst/>
@@ -11800,52 +11800,33 @@
           <a:lstStyle/>
           <a:p>
             <a:r>
-              <a:rPr lang="fr-CA" dirty="0"/>
-              <a:t>À droite, pour le schéma à discrétisation avant, on obtient un ordre de convergence / pente d’environ 1 pour les trois erreurs. L’erreur commise est de l’ordre de 10</a:t>
+              <a:rPr lang="fr-CA" sz="1600" dirty="0"/>
+              <a:t>À droite, on observe le tracé de la concentration de la solution numérique par rapport à la solution analytique. On voit que ces solutions sont initialement exactes à r = 0.5 mais diverge en s’approchant du centre du cylindre. On peut s’attendre à ce résultat étant donné la condition de Dirichlet qui impose la solution à droite.</a:t>
+            </a:r>
+          </a:p>
+          <a:p>
+            <a:endParaRPr lang="fr-CA" sz="1600" dirty="0"/>
+          </a:p>
+          <a:p>
+            <a:r>
+              <a:rPr lang="fr-CA" sz="1600" dirty="0"/>
+              <a:t>À gauche, pour ce schéma, on obtient un ordre de convergence / pente d’environ 1 pour les trois erreurs. L’erreur commise est de l’ordre de 10</a:t>
             </a:r>
             <a:r>
-              <a:rPr lang="fr-CA" baseline="30000" dirty="0"/>
+              <a:rPr lang="fr-CA" sz="1600" baseline="30000" dirty="0"/>
               <a:t>-2</a:t>
             </a:r>
             <a:r>
-              <a:rPr lang="fr-CA" dirty="0"/>
+              <a:rPr lang="fr-CA" sz="1600" dirty="0"/>
               <a:t> à 10</a:t>
             </a:r>
             <a:r>
-              <a:rPr lang="fr-CA" baseline="30000" dirty="0"/>
+              <a:rPr lang="fr-CA" sz="1600" baseline="30000" dirty="0"/>
               <a:t>0</a:t>
             </a:r>
             <a:r>
-              <a:rPr lang="fr-CA" dirty="0"/>
-              <a:t>.</a:t>
-            </a:r>
-          </a:p>
-          <a:p>
-            <a:r>
-              <a:rPr lang="fr-CA" dirty="0"/>
-              <a:t>     </a:t>
-            </a:r>
-          </a:p>
-          <a:p>
-            <a:r>
-              <a:rPr lang="fr-CA" dirty="0"/>
-              <a:t>À gauche, pour le schéma à discrétisation centrée, on obtient un ordre de convergence / pente non concluant, variant de -6.51 à -3.17. L’erreur observée est de 10</a:t>
-            </a:r>
-            <a:r>
-              <a:rPr lang="fr-CA" baseline="30000" dirty="0"/>
-              <a:t>-16</a:t>
-            </a:r>
-            <a:r>
-              <a:rPr lang="fr-CA" dirty="0"/>
-              <a:t> à 10</a:t>
-            </a:r>
-            <a:r>
-              <a:rPr lang="fr-CA" baseline="30000" dirty="0"/>
-              <a:t>-9</a:t>
-            </a:r>
-            <a:r>
-              <a:rPr lang="fr-CA" dirty="0"/>
-              <a:t>. On observe aussi que l’évolution de l’erreur n’est pas linéaire et fluctue énormément.          </a:t>
+              <a:rPr lang="fr-CA" sz="1600" dirty="0"/>
+              <a:t>. Ce résultat est conforme à l’ordre de précision qui a été démontré précédemment.</a:t>
             </a:r>
           </a:p>
         </p:txBody>
@@ -11879,7 +11860,7 @@
         </p:blipFill>
         <p:spPr>
           <a:xfrm>
-            <a:off x="1005508" y="1526573"/>
+            <a:off x="5975478" y="1346657"/>
             <a:ext cx="5250438" cy="3326200"/>
           </a:xfrm>
           <a:prstGeom prst="rect">
@@ -11889,10 +11870,10 @@
       </p:pic>
       <p:pic>
         <p:nvPicPr>
-          <p:cNvPr id="3" name="Picture 10">
+          <p:cNvPr id="6" name="Image 5" descr="Une image contenant ligne, Tracé, texte, diagramme&#10;&#10;Le contenu généré par l’IA peut être incorrect.">
             <a:extLst>
               <a:ext uri="{FF2B5EF4-FFF2-40B4-BE49-F238E27FC236}">
-                <a16:creationId xmlns:a16="http://schemas.microsoft.com/office/drawing/2014/main" id="{8F920ECE-FFB5-003E-9B53-D1888A93C2DA}"/>
+                <a16:creationId xmlns:a16="http://schemas.microsoft.com/office/drawing/2014/main" id="{7DEE5F67-42C2-D599-59DA-D8C9BC4750CA}"/>
               </a:ext>
             </a:extLst>
           </p:cNvPr>
@@ -11909,15 +11890,14 @@
               </a:ext>
             </a:extLst>
           </a:blip>
-          <a:srcRect t="-313" r="-2" b="476"/>
           <a:stretch>
             <a:fillRect/>
           </a:stretch>
         </p:blipFill>
         <p:spPr>
           <a:xfrm>
-            <a:off x="6178944" y="1554529"/>
-            <a:ext cx="5079460" cy="3177144"/>
+            <a:off x="966084" y="1508206"/>
+            <a:ext cx="5298202" cy="3003101"/>
           </a:xfrm>
           <a:prstGeom prst="rect">
             <a:avLst/>
@@ -11945,7 +11925,7 @@
         <p:cNvPr id="1" name="">
           <a:extLst>
             <a:ext uri="{FF2B5EF4-FFF2-40B4-BE49-F238E27FC236}">
-              <a16:creationId xmlns:a16="http://schemas.microsoft.com/office/drawing/2014/main" id="{33BF2412-9FE6-991F-1293-33C5940AA185}"/>
+              <a16:creationId xmlns:a16="http://schemas.microsoft.com/office/drawing/2014/main" id="{171C1E28-C6FD-B155-3AD0-9F4C10F92F91}"/>
             </a:ext>
           </a:extLst>
         </p:cNvPr>
@@ -11965,7 +11945,7 @@
           <p:cNvPr id="2" name="Title 1">
             <a:extLst>
               <a:ext uri="{FF2B5EF4-FFF2-40B4-BE49-F238E27FC236}">
-                <a16:creationId xmlns:a16="http://schemas.microsoft.com/office/drawing/2014/main" id="{DCC8EFB3-455E-A108-8886-D0C3A465D632}"/>
+                <a16:creationId xmlns:a16="http://schemas.microsoft.com/office/drawing/2014/main" id="{950D2871-CAF8-7E62-33F0-5FB4AEF99735}"/>
               </a:ext>
             </a:extLst>
           </p:cNvPr>
@@ -11983,7 +11963,7 @@
           <a:p>
             <a:r>
               <a:rPr lang="fr-FR" dirty="0"/>
-              <a:t>F. Analyse</a:t>
+              <a:t>F. Résultats et analyse - Centré</a:t>
             </a:r>
             <a:endParaRPr lang="en-US" dirty="0"/>
           </a:p>
@@ -11994,7 +11974,7 @@
           <p:cNvPr id="9" name="ZoneTexte 8">
             <a:extLst>
               <a:ext uri="{FF2B5EF4-FFF2-40B4-BE49-F238E27FC236}">
-                <a16:creationId xmlns:a16="http://schemas.microsoft.com/office/drawing/2014/main" id="{ACE9F749-5C73-6D6C-CCA0-8C0119887380}"/>
+                <a16:creationId xmlns:a16="http://schemas.microsoft.com/office/drawing/2014/main" id="{3448371C-C62D-1B6D-F31A-CE8C28EF0E03}"/>
               </a:ext>
             </a:extLst>
           </p:cNvPr>
@@ -12003,8 +11983,8 @@
         </p:nvSpPr>
         <p:spPr>
           <a:xfrm>
-            <a:off x="1140737" y="4934139"/>
-            <a:ext cx="10520126" cy="369332"/>
+            <a:off x="1013989" y="4782981"/>
+            <a:ext cx="10520126" cy="2092881"/>
           </a:xfrm>
           <a:prstGeom prst="rect">
             <a:avLst/>
@@ -12018,26 +11998,54 @@
           <a:lstStyle/>
           <a:p>
             <a:r>
-              <a:rPr lang="fr-CA" dirty="0"/>
-              <a:t>À droite, on obtient un ordre de convergence / pente d’environ 1 pour les trois </a:t>
+              <a:rPr lang="fr-CA" sz="1400" dirty="0"/>
+              <a:t>À droite, on observe le tracé de la concentration de la solution numérique par rapport à la solution analytique. On voit que ces solutions sont exactement identiques. Cela est conforme aux attentes d’un schéma d’ordre 2, permettant de résoudre exactement une équation différentielle d’ordre 2.</a:t>
+            </a:r>
+          </a:p>
+          <a:p>
+            <a:r>
+              <a:rPr lang="fr-CA" sz="1400" dirty="0"/>
+              <a:t>     </a:t>
+            </a:r>
+          </a:p>
+          <a:p>
+            <a:r>
+              <a:rPr lang="fr-CA" sz="1400" dirty="0"/>
+              <a:t>À gauche, pour le schéma à discrétisation centrée, on obtient un ordre de convergence / pente non concluant, variant de -6.51 à -3.17. L’erreur observée est de 10</a:t>
             </a:r>
             <a:r>
-              <a:rPr lang="fr-CA" dirty="0" err="1"/>
-              <a:t>erreures</a:t>
+              <a:rPr lang="fr-CA" sz="1400" baseline="30000" dirty="0"/>
+              <a:t>-16</a:t>
             </a:r>
             <a:r>
-              <a:rPr lang="fr-CA" dirty="0"/>
-              <a:t>.</a:t>
+              <a:rPr lang="fr-CA" sz="1400" dirty="0"/>
+              <a:t> à 10</a:t>
+            </a:r>
+            <a:r>
+              <a:rPr lang="fr-CA" sz="1400" baseline="30000" dirty="0"/>
+              <a:t>-9</a:t>
+            </a:r>
+            <a:r>
+              <a:rPr lang="fr-CA" sz="1400" dirty="0"/>
+              <a:t>. On observe aussi que l’évolution de l’erreur n’est pas linéaire et fluctue énormément. Ce résultat peut sembler surprenant, mais on réalise rapidement que le schéma, pour un pas grossier, ne commet presque pas d’erreur. Plus on diminue le pas, plus l’erreur augmente ; cela s’explique par l’erreur en virgule flottante, qui surgit lorsque l’erreur décroit rapidement (dans ce cas O(</a:t>
+            </a:r>
+            <a:r>
+              <a:rPr lang="el-GR" sz="1400" dirty="0"/>
+              <a:t>Δ</a:t>
+            </a:r>
+            <a:r>
+              <a:rPr lang="fr-CA" sz="1400" dirty="0"/>
+              <a:t>r2)) et atteint la précision machine.</a:t>
             </a:r>
           </a:p>
         </p:txBody>
       </p:sp>
       <p:pic>
         <p:nvPicPr>
-          <p:cNvPr id="15" name="Picture 14">
+          <p:cNvPr id="3" name="Picture 10">
             <a:extLst>
               <a:ext uri="{FF2B5EF4-FFF2-40B4-BE49-F238E27FC236}">
-                <a16:creationId xmlns:a16="http://schemas.microsoft.com/office/drawing/2014/main" id="{06968853-09EB-0CCE-5330-3156230123C8}"/>
+                <a16:creationId xmlns:a16="http://schemas.microsoft.com/office/drawing/2014/main" id="{39C6FE16-14F8-965F-66B5-337906A3BB87}"/>
               </a:ext>
             </a:extLst>
           </p:cNvPr>
@@ -12048,43 +12056,6 @@
         </p:nvPicPr>
         <p:blipFill>
           <a:blip r:embed="rId2">
-            <a:extLst>
-              <a:ext uri="{28A0092B-C50C-407E-A947-70E740481C1C}">
-                <a14:useLocalDpi xmlns:a14="http://schemas.microsoft.com/office/drawing/2010/main" val="0"/>
-              </a:ext>
-            </a:extLst>
-          </a:blip>
-          <a:srcRect r="-2" b="-1570"/>
-          <a:stretch>
-            <a:fillRect/>
-          </a:stretch>
-        </p:blipFill>
-        <p:spPr>
-          <a:xfrm>
-            <a:off x="1005508" y="1526573"/>
-            <a:ext cx="5250438" cy="3326200"/>
-          </a:xfrm>
-          <a:prstGeom prst="rect">
-            <a:avLst/>
-          </a:prstGeom>
-        </p:spPr>
-      </p:pic>
-      <p:pic>
-        <p:nvPicPr>
-          <p:cNvPr id="3" name="Picture 10">
-            <a:extLst>
-              <a:ext uri="{FF2B5EF4-FFF2-40B4-BE49-F238E27FC236}">
-                <a16:creationId xmlns:a16="http://schemas.microsoft.com/office/drawing/2014/main" id="{FAE3C0AA-1646-B38F-CD2B-49E89112526A}"/>
-              </a:ext>
-            </a:extLst>
-          </p:cNvPr>
-          <p:cNvPicPr>
-            <a:picLocks noChangeAspect="1"/>
-          </p:cNvPicPr>
-          <p:nvPr/>
-        </p:nvPicPr>
-        <p:blipFill>
-          <a:blip r:embed="rId3">
             <a:extLst>
               <a:ext uri="{28A0092B-C50C-407E-A947-70E740481C1C}">
                 <a14:useLocalDpi xmlns:a14="http://schemas.microsoft.com/office/drawing/2010/main" val="0"/>
@@ -12106,10 +12077,46 @@
           </a:prstGeom>
         </p:spPr>
       </p:pic>
+      <p:pic>
+        <p:nvPicPr>
+          <p:cNvPr id="7" name="Image 6" descr="Une image contenant ligne, texte, Tracé, diagramme&#10;&#10;Le contenu généré par l’IA peut être incorrect.">
+            <a:extLst>
+              <a:ext uri="{FF2B5EF4-FFF2-40B4-BE49-F238E27FC236}">
+                <a16:creationId xmlns:a16="http://schemas.microsoft.com/office/drawing/2014/main" id="{226DB800-8299-D72F-FD10-DF7E30FC5174}"/>
+              </a:ext>
+            </a:extLst>
+          </p:cNvPr>
+          <p:cNvPicPr>
+            <a:picLocks noChangeAspect="1"/>
+          </p:cNvPicPr>
+          <p:nvPr/>
+        </p:nvPicPr>
+        <p:blipFill>
+          <a:blip r:embed="rId3">
+            <a:extLst>
+              <a:ext uri="{28A0092B-C50C-407E-A947-70E740481C1C}">
+                <a14:useLocalDpi xmlns:a14="http://schemas.microsoft.com/office/drawing/2010/main" val="0"/>
+              </a:ext>
+            </a:extLst>
+          </a:blip>
+          <a:stretch>
+            <a:fillRect/>
+          </a:stretch>
+        </p:blipFill>
+        <p:spPr>
+          <a:xfrm>
+            <a:off x="619806" y="1567296"/>
+            <a:ext cx="5654246" cy="3215685"/>
+          </a:xfrm>
+          <a:prstGeom prst="rect">
+            <a:avLst/>
+          </a:prstGeom>
+        </p:spPr>
+      </p:pic>
     </p:spTree>
     <p:extLst>
       <p:ext uri="{BB962C8B-B14F-4D97-AF65-F5344CB8AC3E}">
-        <p14:creationId xmlns:p14="http://schemas.microsoft.com/office/powerpoint/2010/main" val="3121283644"/>
+        <p14:creationId xmlns:p14="http://schemas.microsoft.com/office/powerpoint/2010/main" val="1752982874"/>
       </p:ext>
     </p:extLst>
   </p:cSld>

</xml_diff>

<commit_message>
Ajout du terme S dans la discrétisation
</commit_message>
<xml_diff>
--- a/MEC8211-Devoir1.pptx
+++ b/MEC8211-Devoir1.pptx
@@ -10964,6 +10964,28 @@
                         </m:r>
                       </m:sup>
                     </m:sSup>
+                    <m:r>
+                      <a:rPr lang="fr-CA" sz="2000" b="0" i="1" dirty="0" smtClean="0">
+                        <a:solidFill>
+                          <a:schemeClr val="accent3">
+                            <a:lumMod val="75000"/>
+                          </a:schemeClr>
+                        </a:solidFill>
+                        <a:latin typeface="Cambria Math" panose="02040503050406030204" pitchFamily="18" charset="0"/>
+                      </a:rPr>
+                      <m:t>−</m:t>
+                    </m:r>
+                    <m:r>
+                      <a:rPr lang="fr-CA" sz="2000" b="0" i="1" dirty="0" smtClean="0">
+                        <a:solidFill>
+                          <a:schemeClr val="accent3">
+                            <a:lumMod val="75000"/>
+                          </a:schemeClr>
+                        </a:solidFill>
+                        <a:latin typeface="Cambria Math" panose="02040503050406030204" pitchFamily="18" charset="0"/>
+                      </a:rPr>
+                      <m:t>𝑆</m:t>
+                    </m:r>
                     <m:r>
                       <a:rPr lang="fr-CA" sz="2000" b="0" i="1" dirty="0" smtClean="0">
                         <a:solidFill>

</xml_diff>

<commit_message>
Term correction in troncature
</commit_message>
<xml_diff>
--- a/MEC8211-Devoir1.pptx
+++ b/MEC8211-Devoir1.pptx
@@ -10652,10 +10652,10 @@
                       </a:rPr>
                       <m:t>+</m:t>
                     </m:r>
-                    <m:f>
-                      <m:fPr>
+                    <m:sSub>
+                      <m:sSubPr>
                         <m:ctrlPr>
-                          <a:rPr lang="fr-FR" sz="2000" b="0" i="1" dirty="0" smtClean="0">
+                          <a:rPr lang="fr-CA" sz="2000" b="0" i="1" dirty="0" smtClean="0">
                             <a:solidFill>
                               <a:schemeClr val="accent3">
                                 <a:lumMod val="75000"/>
@@ -10664,52 +10664,10 @@
                             <a:latin typeface="Cambria Math" panose="02040503050406030204" pitchFamily="18" charset="0"/>
                           </a:rPr>
                         </m:ctrlPr>
-                      </m:fPr>
-                      <m:num>
-                        <m:sSub>
-                          <m:sSubPr>
-                            <m:ctrlPr>
-                              <a:rPr lang="fr-FR" sz="2000" b="0" i="1" dirty="0" smtClean="0">
-                                <a:solidFill>
-                                  <a:schemeClr val="accent3">
-                                    <a:lumMod val="75000"/>
-                                  </a:schemeClr>
-                                </a:solidFill>
-                                <a:latin typeface="Cambria Math" panose="02040503050406030204" pitchFamily="18" charset="0"/>
-                              </a:rPr>
-                            </m:ctrlPr>
-                          </m:sSubPr>
-                          <m:e>
-                            <m:r>
-                              <a:rPr lang="fr-FR" sz="2000" b="0" i="1" dirty="0" smtClean="0">
-                                <a:solidFill>
-                                  <a:schemeClr val="accent3">
-                                    <a:lumMod val="75000"/>
-                                  </a:schemeClr>
-                                </a:solidFill>
-                                <a:latin typeface="Cambria Math" panose="02040503050406030204" pitchFamily="18" charset="0"/>
-                              </a:rPr>
-                              <m:t>𝐷</m:t>
-                            </m:r>
-                          </m:e>
-                          <m:sub>
-                            <m:r>
-                              <a:rPr lang="fr-FR" sz="2000" b="0" i="1" dirty="0" smtClean="0">
-                                <a:solidFill>
-                                  <a:schemeClr val="accent3">
-                                    <a:lumMod val="75000"/>
-                                  </a:schemeClr>
-                                </a:solidFill>
-                                <a:latin typeface="Cambria Math" panose="02040503050406030204" pitchFamily="18" charset="0"/>
-                              </a:rPr>
-                              <m:t>𝑒𝑓𝑓</m:t>
-                            </m:r>
-                          </m:sub>
-                        </m:sSub>
-                      </m:num>
-                      <m:den>
-                        <m:r>
-                          <a:rPr lang="fr-FR" sz="2000" b="0" i="1" dirty="0" smtClean="0">
+                      </m:sSubPr>
+                      <m:e>
+                        <m:r>
+                          <a:rPr lang="fr-CA" sz="2000" b="0" i="1" dirty="0" smtClean="0">
                             <a:solidFill>
                               <a:schemeClr val="accent3">
                                 <a:lumMod val="75000"/>
@@ -10717,10 +10675,12 @@
                             </a:solidFill>
                             <a:latin typeface="Cambria Math" panose="02040503050406030204" pitchFamily="18" charset="0"/>
                           </a:rPr>
-                          <m:t>2</m:t>
-                        </m:r>
-                        <m:r>
-                          <a:rPr lang="fr-FR" sz="2000" b="0" i="1" dirty="0" smtClean="0">
+                          <m:t>𝐷</m:t>
+                        </m:r>
+                      </m:e>
+                      <m:sub>
+                        <m:r>
+                          <a:rPr lang="fr-CA" sz="2000" b="0" i="1" dirty="0" smtClean="0">
                             <a:solidFill>
                               <a:schemeClr val="accent3">
                                 <a:lumMod val="75000"/>
@@ -10728,10 +10688,10 @@
                             </a:solidFill>
                             <a:latin typeface="Cambria Math" panose="02040503050406030204" pitchFamily="18" charset="0"/>
                           </a:rPr>
-                          <m:t>𝑟</m:t>
-                        </m:r>
-                      </m:den>
-                    </m:f>
+                          <m:t>𝑒𝑓𝑓</m:t>
+                        </m:r>
+                      </m:sub>
+                    </m:sSub>
                     <m:f>
                       <m:fPr>
                         <m:ctrlPr>

</xml_diff>

<commit_message>
Erreur de troncature à l'ordre 2 et non 3!
On avait mis ordre 4 pour discrétisation centrée de dérivée seconde
On avait mis ordre 3 pour discrétisation centrée de dérivée première

Les deux sont d'ordre 2!
</commit_message>
<xml_diff>
--- a/MEC8211-Devoir1.pptx
+++ b/MEC8211-Devoir1.pptx
@@ -3776,8 +3776,8 @@
           <a:chExt cx="0" cy="0"/>
         </a:xfrm>
       </p:grpSpPr>
-      <mc:AlternateContent xmlns:mc="http://schemas.openxmlformats.org/markup-compatibility/2006">
-        <mc:Choice xmlns:a14="http://schemas.microsoft.com/office/drawing/2010/main" Requires="a14">
+      <mc:AlternateContent xmlns:mc="http://schemas.openxmlformats.org/markup-compatibility/2006" xmlns:a14="http://schemas.microsoft.com/office/drawing/2010/main">
+        <mc:Choice Requires="a14">
           <p:sp>
             <p:nvSpPr>
               <p:cNvPr id="3" name="Espace réservé du contenu 2">
@@ -3957,7 +3957,7 @@
             </p:txBody>
           </p:sp>
         </mc:Choice>
-        <mc:Fallback>
+        <mc:Fallback xmlns="">
           <p:sp>
             <p:nvSpPr>
               <p:cNvPr id="3" name="Espace réservé du contenu 2">
@@ -4090,8 +4090,8 @@
           <a:chExt cx="0" cy="0"/>
         </a:xfrm>
       </p:grpSpPr>
-      <mc:AlternateContent xmlns:mc="http://schemas.openxmlformats.org/markup-compatibility/2006">
-        <mc:Choice xmlns:a14="http://schemas.microsoft.com/office/drawing/2010/main" Requires="a14">
+      <mc:AlternateContent xmlns:mc="http://schemas.openxmlformats.org/markup-compatibility/2006" xmlns:a14="http://schemas.microsoft.com/office/drawing/2010/main">
+        <mc:Choice Requires="a14">
           <p:sp>
             <p:nvSpPr>
               <p:cNvPr id="3" name="Espace réservé du contenu 2">
@@ -4559,13 +4559,7 @@
                           <a:rPr lang="fr-FR" b="0" i="1" noProof="0" smtClean="0">
                             <a:latin typeface="Cambria Math" panose="02040503050406030204" pitchFamily="18" charset="0"/>
                           </a:rPr>
-                          <m:t>𝐶</m:t>
-                        </m:r>
-                        <m:r>
-                          <a:rPr lang="fr-FR" b="0" i="1" noProof="0" smtClean="0">
-                            <a:latin typeface="Cambria Math" panose="02040503050406030204" pitchFamily="18" charset="0"/>
-                          </a:rPr>
-                          <m:t>𝑠𝑡</m:t>
+                          <m:t>𝐶𝑠𝑡</m:t>
                         </m:r>
                       </m:e>
                       <m:sub>
@@ -4992,13 +4986,7 @@
                           <a:rPr lang="fr-FR" b="0" i="1" noProof="0" smtClean="0">
                             <a:latin typeface="Cambria Math" panose="02040503050406030204" pitchFamily="18" charset="0"/>
                           </a:rPr>
-                          <m:t>𝐶</m:t>
-                        </m:r>
-                        <m:r>
-                          <a:rPr lang="fr-FR" b="0" i="1" noProof="0" smtClean="0">
-                            <a:latin typeface="Cambria Math" panose="02040503050406030204" pitchFamily="18" charset="0"/>
-                          </a:rPr>
-                          <m:t>𝑠𝑡</m:t>
+                          <m:t>𝐶𝑠𝑡</m:t>
                         </m:r>
                       </m:e>
                       <m:sub>
@@ -5132,13 +5120,7 @@
                           <a:rPr lang="fr-FR" b="0" i="1" noProof="0" smtClean="0">
                             <a:latin typeface="Cambria Math" panose="02040503050406030204" pitchFamily="18" charset="0"/>
                           </a:rPr>
-                          <m:t>𝐶</m:t>
-                        </m:r>
-                        <m:r>
-                          <a:rPr lang="fr-FR" b="0" i="1" noProof="0" smtClean="0">
-                            <a:latin typeface="Cambria Math" panose="02040503050406030204" pitchFamily="18" charset="0"/>
-                          </a:rPr>
-                          <m:t>𝑠𝑡</m:t>
+                          <m:t>𝐶𝑠𝑡</m:t>
                         </m:r>
                       </m:e>
                       <m:sub>
@@ -5487,7 +5469,7 @@
             </p:txBody>
           </p:sp>
         </mc:Choice>
-        <mc:Fallback>
+        <mc:Fallback xmlns="">
           <p:sp>
             <p:nvSpPr>
               <p:cNvPr id="3" name="Espace réservé du contenu 2">
@@ -5816,8 +5798,8 @@
           </a:p>
         </p:txBody>
       </p:sp>
-      <mc:AlternateContent xmlns:mc="http://schemas.openxmlformats.org/markup-compatibility/2006">
-        <mc:Choice xmlns:a14="http://schemas.microsoft.com/office/drawing/2010/main" Requires="a14">
+      <mc:AlternateContent xmlns:mc="http://schemas.openxmlformats.org/markup-compatibility/2006" xmlns:a14="http://schemas.microsoft.com/office/drawing/2010/main">
+        <mc:Choice Requires="a14">
           <p:sp>
             <p:nvSpPr>
               <p:cNvPr id="3" name="Content Placeholder 2">
@@ -6003,13 +5985,7 @@
                           <a:rPr lang="fr-FR" b="0" i="1" noProof="0" smtClean="0">
                             <a:latin typeface="Cambria Math" panose="02040503050406030204" pitchFamily="18" charset="0"/>
                           </a:rPr>
-                          <m:t>=0 →</m:t>
-                        </m:r>
-                        <m:r>
-                          <a:rPr lang="fr-FR" b="0" i="1" noProof="0" smtClean="0">
-                            <a:latin typeface="Cambria Math" panose="02040503050406030204" pitchFamily="18" charset="0"/>
-                          </a:rPr>
-                          <m:t>  </m:t>
+                          <m:t>=0 →  </m:t>
                         </m:r>
                         <m:r>
                           <a:rPr lang="fr-FR" b="0" i="1" noProof="0" smtClean="0">
@@ -6705,7 +6681,7 @@
             </p:txBody>
           </p:sp>
         </mc:Choice>
-        <mc:Fallback>
+        <mc:Fallback xmlns="">
           <p:sp>
             <p:nvSpPr>
               <p:cNvPr id="3" name="Content Placeholder 2">
@@ -9506,10 +9482,10 @@
                       </m:e>
                       <m:sup>
                         <m:r>
-                          <a:rPr lang="fr-FR" sz="2000" b="0" i="1" noProof="0" smtClean="0">
-                            <a:latin typeface="Cambria Math" panose="02040503050406030204" pitchFamily="18" charset="0"/>
-                          </a:rPr>
-                          <m:t>4</m:t>
+                          <a:rPr lang="fr-CA" sz="2000" b="0" i="1" noProof="0" smtClean="0">
+                            <a:latin typeface="Cambria Math" panose="02040503050406030204" pitchFamily="18" charset="0"/>
+                          </a:rPr>
+                          <m:t>2</m:t>
                         </m:r>
                       </m:sup>
                     </m:sSup>
@@ -9810,7 +9786,7 @@
                           </m:e>
                           <m:sup>
                             <m:r>
-                              <a:rPr lang="fr-FR" sz="2000" i="1" noProof="0" smtClean="0">
+                              <a:rPr lang="fr-CA" sz="2000" b="0" i="1" noProof="0" smtClean="0">
                                 <a:solidFill>
                                   <a:schemeClr val="accent5">
                                     <a:lumMod val="75000"/>
@@ -9818,7 +9794,7 @@
                                 </a:solidFill>
                                 <a:latin typeface="Cambria Math" panose="02040503050406030204" pitchFamily="18" charset="0"/>
                               </a:rPr>
-                              <m:t>4</m:t>
+                              <m:t>2</m:t>
                             </m:r>
                           </m:sup>
                         </m:sSup>
@@ -11321,7 +11297,7 @@
               <a:lstStyle/>
               <a:p>
                 <a:r>
-                  <a:rPr lang="fr-FR">
+                  <a:rPr lang="fr-CA">
                     <a:noFill/>
                   </a:rPr>
                   <a:t> </a:t>
@@ -12272,10 +12248,10 @@
                       </m:e>
                       <m:sup>
                         <m:r>
-                          <a:rPr lang="fr-FR" i="1" noProof="0" smtClean="0">
-                            <a:latin typeface="Cambria Math" panose="02040503050406030204" pitchFamily="18" charset="0"/>
-                          </a:rPr>
-                          <m:t>4</m:t>
+                          <a:rPr lang="fr-CA" b="0" i="1" noProof="0" smtClean="0">
+                            <a:latin typeface="Cambria Math" panose="02040503050406030204" pitchFamily="18" charset="0"/>
+                          </a:rPr>
+                          <m:t>2</m:t>
                         </m:r>
                       </m:sup>
                     </m:sSup>
@@ -12570,13 +12546,13 @@
                           </m:e>
                           <m:sup>
                             <m:r>
-                              <a:rPr lang="fr-FR" b="0" i="1" noProof="0" smtClean="0">
+                              <a:rPr lang="fr-CA" b="0" i="1" noProof="0" smtClean="0">
                                 <a:solidFill>
                                   <a:schemeClr val="tx1"/>
                                 </a:solidFill>
                                 <a:latin typeface="Cambria Math" panose="02040503050406030204" pitchFamily="18" charset="0"/>
                               </a:rPr>
-                              <m:t>3</m:t>
+                              <m:t>2</m:t>
                             </m:r>
                           </m:sup>
                         </m:sSup>
@@ -13159,7 +13135,7 @@
                           </m:e>
                           <m:sup>
                             <m:r>
-                              <a:rPr lang="fr-FR" b="0" i="1" noProof="0" smtClean="0">
+                              <a:rPr lang="fr-CA" b="0" i="1" noProof="0" smtClean="0">
                                 <a:solidFill>
                                   <a:schemeClr val="accent5">
                                     <a:lumMod val="75000"/>
@@ -13167,7 +13143,7 @@
                                 </a:solidFill>
                                 <a:latin typeface="Cambria Math" panose="02040503050406030204" pitchFamily="18" charset="0"/>
                               </a:rPr>
-                              <m:t>3</m:t>
+                              <m:t>2</m:t>
                             </m:r>
                           </m:sup>
                         </m:sSup>
@@ -13261,31 +13237,8 @@
                   <a:rPr lang="fr-FR" noProof="0" dirty="0">
                     <a:latin typeface="Cambria Math" panose="02040503050406030204" pitchFamily="18" charset="0"/>
                   </a:rPr>
-                  <a:t>Ordre de précision attendu : 3 par rapport à r</a:t>
+                  <a:t>Ordre de précision attendu : 2 par rapport à r</a:t>
                 </a:r>
-              </a:p>
-              <a:p>
-                <a:r>
-                  <a:rPr lang="fr-FR" dirty="0">
-                    <a:latin typeface="Cambria Math" panose="02040503050406030204" pitchFamily="18" charset="0"/>
-                  </a:rPr>
-                  <a:t>Erreur de </a:t>
-                </a:r>
-                <a:r>
-                  <a:rPr lang="fr-FR">
-                    <a:latin typeface="Cambria Math" panose="02040503050406030204" pitchFamily="18" charset="0"/>
-                  </a:rPr>
-                  <a:t>troncature nulle </a:t>
-                </a:r>
-                <a:endParaRPr lang="fr-FR" noProof="0" dirty="0">
-                  <a:latin typeface="Cambria Math" panose="02040503050406030204" pitchFamily="18" charset="0"/>
-                </a:endParaRPr>
-              </a:p>
-              <a:p>
-                <a:pPr marL="0" indent="0">
-                  <a:buNone/>
-                </a:pPr>
-                <a:endParaRPr lang="fr-FR" noProof="0" dirty="0"/>
               </a:p>
             </p:txBody>
           </p:sp>
@@ -13320,7 +13273,7 @@
               <a:lstStyle/>
               <a:p>
                 <a:r>
-                  <a:rPr lang="fr-FR">
+                  <a:rPr lang="fr-CA">
                     <a:noFill/>
                   </a:rPr>
                   <a:t> </a:t>

</xml_diff>

<commit_message>
Ajout slide sur la vérification de code
</commit_message>
<xml_diff>
--- a/MEC8211-Devoir1.pptx
+++ b/MEC8211-Devoir1.pptx
@@ -12,8 +12,9 @@
     <p:sldId id="262" r:id="rId6"/>
     <p:sldId id="263" r:id="rId7"/>
     <p:sldId id="261" r:id="rId8"/>
-    <p:sldId id="265" r:id="rId9"/>
+    <p:sldId id="270" r:id="rId9"/>
     <p:sldId id="269" r:id="rId10"/>
+    <p:sldId id="265" r:id="rId11"/>
   </p:sldIdLst>
   <p:sldSz cx="12192000" cy="6858000"/>
   <p:notesSz cx="6858000" cy="9144000"/>
@@ -3420,6 +3421,125 @@
 </p:sld>
 </file>
 
+<file path=ppt/slides/slide10.xml><?xml version="1.0" encoding="utf-8"?>
+<p:sld xmlns:a="http://schemas.openxmlformats.org/drawingml/2006/main" xmlns:r="http://schemas.openxmlformats.org/officeDocument/2006/relationships" xmlns:p="http://schemas.openxmlformats.org/presentationml/2006/main">
+  <p:cSld>
+    <p:spTree>
+      <p:nvGrpSpPr>
+        <p:cNvPr id="1" name="">
+          <a:extLst>
+            <a:ext uri="{FF2B5EF4-FFF2-40B4-BE49-F238E27FC236}">
+              <a16:creationId xmlns:a16="http://schemas.microsoft.com/office/drawing/2014/main" id="{C5C29396-D17B-4139-FFB2-731B93C34A9C}"/>
+            </a:ext>
+          </a:extLst>
+        </p:cNvPr>
+        <p:cNvGrpSpPr/>
+        <p:nvPr/>
+      </p:nvGrpSpPr>
+      <p:grpSpPr>
+        <a:xfrm>
+          <a:off x="0" y="0"/>
+          <a:ext cx="0" cy="0"/>
+          <a:chOff x="0" y="0"/>
+          <a:chExt cx="0" cy="0"/>
+        </a:xfrm>
+      </p:grpSpPr>
+      <p:sp>
+        <p:nvSpPr>
+          <p:cNvPr id="2" name="Title 1">
+            <a:extLst>
+              <a:ext uri="{FF2B5EF4-FFF2-40B4-BE49-F238E27FC236}">
+                <a16:creationId xmlns:a16="http://schemas.microsoft.com/office/drawing/2014/main" id="{1E00507C-3A11-54A5-46DE-25BB48B4F5B3}"/>
+              </a:ext>
+            </a:extLst>
+          </p:cNvPr>
+          <p:cNvSpPr>
+            <a:spLocks noGrp="1"/>
+          </p:cNvSpPr>
+          <p:nvPr>
+            <p:ph type="title"/>
+          </p:nvPr>
+        </p:nvSpPr>
+        <p:spPr/>
+        <p:txBody>
+          <a:bodyPr/>
+          <a:lstStyle/>
+          <a:p>
+            <a:r>
+              <a:rPr lang="fr-FR" noProof="0" dirty="0"/>
+              <a:t>G. Vérification de code</a:t>
+            </a:r>
+          </a:p>
+        </p:txBody>
+      </p:sp>
+      <p:sp>
+        <p:nvSpPr>
+          <p:cNvPr id="9" name="ZoneTexte 8">
+            <a:extLst>
+              <a:ext uri="{FF2B5EF4-FFF2-40B4-BE49-F238E27FC236}">
+                <a16:creationId xmlns:a16="http://schemas.microsoft.com/office/drawing/2014/main" id="{956B2C77-283E-DF73-AD29-6A345270E2A1}"/>
+              </a:ext>
+            </a:extLst>
+          </p:cNvPr>
+          <p:cNvSpPr txBox="1"/>
+          <p:nvPr/>
+        </p:nvSpPr>
+        <p:spPr>
+          <a:xfrm>
+            <a:off x="833674" y="2175263"/>
+            <a:ext cx="10520126" cy="1938992"/>
+          </a:xfrm>
+          <a:prstGeom prst="rect">
+            <a:avLst/>
+          </a:prstGeom>
+          <a:noFill/>
+        </p:spPr>
+        <p:txBody>
+          <a:bodyPr wrap="square" rtlCol="0">
+            <a:spAutoFit/>
+          </a:bodyPr>
+          <a:lstStyle/>
+          <a:p>
+            <a:r>
+              <a:rPr lang="fr-FR" sz="2000" dirty="0"/>
+              <a:t>Un module de test a été ajouté au projet, à l’aide du </a:t>
+            </a:r>
+            <a:r>
+              <a:rPr lang="fr-FR" sz="2000" dirty="0" err="1"/>
+              <a:t>framework</a:t>
+            </a:r>
+            <a:r>
+              <a:rPr lang="fr-FR" sz="2000" dirty="0"/>
+              <a:t> python </a:t>
+            </a:r>
+            <a:r>
+              <a:rPr lang="fr-FR" sz="2000" i="1" dirty="0" err="1"/>
+              <a:t>unittest</a:t>
+            </a:r>
+            <a:r>
+              <a:rPr lang="fr-FR" sz="2000" dirty="0"/>
+              <a:t>, afin de pouvoir ajouter un ensemble de test facilement pour pouvoir tester le code. Pour </a:t>
+            </a:r>
+            <a:r>
+              <a:rPr lang="fr-FR" sz="2000" noProof="0" dirty="0"/>
+              <a:t>ce qui est de la vérification, les ordres de précision asymptotiques sont un bon indicateur pour vérifier le code. Additionnellement, un test d’invariance galiléenne a été ajouté pour s’assurer que le code fonctionne correctement. D’autres tests de profilage ont été réalisés afin de s’assurer que le code produit des résultats valide (non nuls ou None) en sortie.</a:t>
+            </a:r>
+          </a:p>
+        </p:txBody>
+      </p:sp>
+    </p:spTree>
+    <p:extLst>
+      <p:ext uri="{BB962C8B-B14F-4D97-AF65-F5344CB8AC3E}">
+        <p14:creationId xmlns:p14="http://schemas.microsoft.com/office/powerpoint/2010/main" val="2362006038"/>
+      </p:ext>
+    </p:extLst>
+  </p:cSld>
+  <p:clrMapOvr>
+    <a:masterClrMapping/>
+  </p:clrMapOvr>
+</p:sld>
+</file>
+
 <file path=ppt/slides/slide2.xml><?xml version="1.0" encoding="utf-8"?>
 <p:sld xmlns:a="http://schemas.openxmlformats.org/drawingml/2006/main" xmlns:r="http://schemas.openxmlformats.org/officeDocument/2006/relationships" xmlns:p="http://schemas.openxmlformats.org/presentationml/2006/main">
   <p:cSld>
@@ -13304,7 +13424,7 @@
         <p:cNvPr id="1" name="">
           <a:extLst>
             <a:ext uri="{FF2B5EF4-FFF2-40B4-BE49-F238E27FC236}">
-              <a16:creationId xmlns:a16="http://schemas.microsoft.com/office/drawing/2014/main" id="{C5C29396-D17B-4139-FFB2-731B93C34A9C}"/>
+              <a16:creationId xmlns:a16="http://schemas.microsoft.com/office/drawing/2014/main" id="{E4319BA3-DA20-A1C6-EAF3-922AA061287F}"/>
             </a:ext>
           </a:extLst>
         </p:cNvPr>
@@ -13324,7 +13444,7 @@
           <p:cNvPr id="2" name="Title 1">
             <a:extLst>
               <a:ext uri="{FF2B5EF4-FFF2-40B4-BE49-F238E27FC236}">
-                <a16:creationId xmlns:a16="http://schemas.microsoft.com/office/drawing/2014/main" id="{1E00507C-3A11-54A5-46DE-25BB48B4F5B3}"/>
+                <a16:creationId xmlns:a16="http://schemas.microsoft.com/office/drawing/2014/main" id="{541F25EE-A5EB-2D1B-D153-55AD345B6658}"/>
               </a:ext>
             </a:extLst>
           </p:cNvPr>
@@ -13352,7 +13472,7 @@
           <p:cNvPr id="9" name="ZoneTexte 8">
             <a:extLst>
               <a:ext uri="{FF2B5EF4-FFF2-40B4-BE49-F238E27FC236}">
-                <a16:creationId xmlns:a16="http://schemas.microsoft.com/office/drawing/2014/main" id="{956B2C77-283E-DF73-AD29-6A345270E2A1}"/>
+                <a16:creationId xmlns:a16="http://schemas.microsoft.com/office/drawing/2014/main" id="{E6ED19CA-B08B-2AB5-C07E-D3F11BA2E8FF}"/>
               </a:ext>
             </a:extLst>
           </p:cNvPr>
@@ -13412,7 +13532,7 @@
           <p:cNvPr id="15" name="Picture 14">
             <a:extLst>
               <a:ext uri="{FF2B5EF4-FFF2-40B4-BE49-F238E27FC236}">
-                <a16:creationId xmlns:a16="http://schemas.microsoft.com/office/drawing/2014/main" id="{D78F9CC7-F47A-7242-E4B5-3C84090E800A}"/>
+                <a16:creationId xmlns:a16="http://schemas.microsoft.com/office/drawing/2014/main" id="{5E1F0269-2538-9797-D496-C6ADC8259BC9}"/>
               </a:ext>
             </a:extLst>
           </p:cNvPr>
@@ -13449,7 +13569,7 @@
           <p:cNvPr id="6" name="Image 5" descr="Une image contenant ligne, Tracé, texte, diagramme&#10;&#10;Le contenu généré par l’IA peut être incorrect.">
             <a:extLst>
               <a:ext uri="{FF2B5EF4-FFF2-40B4-BE49-F238E27FC236}">
-                <a16:creationId xmlns:a16="http://schemas.microsoft.com/office/drawing/2014/main" id="{7DEE5F67-42C2-D599-59DA-D8C9BC4750CA}"/>
+                <a16:creationId xmlns:a16="http://schemas.microsoft.com/office/drawing/2014/main" id="{F0EA7C9B-4EBA-DD0B-3451-3D16FC35CA8B}"/>
               </a:ext>
             </a:extLst>
           </p:cNvPr>
@@ -13483,7 +13603,7 @@
     </p:spTree>
     <p:extLst>
       <p:ext uri="{BB962C8B-B14F-4D97-AF65-F5344CB8AC3E}">
-        <p14:creationId xmlns:p14="http://schemas.microsoft.com/office/powerpoint/2010/main" val="2362006038"/>
+        <p14:creationId xmlns:p14="http://schemas.microsoft.com/office/powerpoint/2010/main" val="4094169471"/>
       </p:ext>
     </p:extLst>
   </p:cSld>

</xml_diff>

<commit_message>
Description des graphes était inversée
</commit_message>
<xml_diff>
--- a/MEC8211-Devoir1.pptx
+++ b/MEC8211-Devoir1.pptx
@@ -7116,8 +7116,8 @@
           </a:p>
         </p:txBody>
       </p:sp>
-      <mc:AlternateContent xmlns:mc="http://schemas.openxmlformats.org/markup-compatibility/2006">
-        <mc:Choice xmlns:a14="http://schemas.microsoft.com/office/drawing/2010/main" Requires="a14">
+      <mc:AlternateContent xmlns:mc="http://schemas.openxmlformats.org/markup-compatibility/2006" xmlns:a14="http://schemas.microsoft.com/office/drawing/2010/main">
+        <mc:Choice Requires="a14">
           <p:sp>
             <p:nvSpPr>
               <p:cNvPr id="3" name="Content Placeholder 2">
@@ -11387,7 +11387,7 @@
             </p:txBody>
           </p:sp>
         </mc:Choice>
-        <mc:Fallback>
+        <mc:Fallback xmlns="">
           <p:sp>
             <p:nvSpPr>
               <p:cNvPr id="3" name="Content Placeholder 2">
@@ -11485,8 +11485,8 @@
           </a:p>
         </p:txBody>
       </p:sp>
-      <mc:AlternateContent xmlns:mc="http://schemas.openxmlformats.org/markup-compatibility/2006">
-        <mc:Choice xmlns:a14="http://schemas.microsoft.com/office/drawing/2010/main" Requires="a14">
+      <mc:AlternateContent xmlns:mc="http://schemas.openxmlformats.org/markup-compatibility/2006" xmlns:a14="http://schemas.microsoft.com/office/drawing/2010/main">
+        <mc:Choice Requires="a14">
           <p:sp>
             <p:nvSpPr>
               <p:cNvPr id="3" name="Content Placeholder 2">
@@ -13363,7 +13363,7 @@
             </p:txBody>
           </p:sp>
         </mc:Choice>
-        <mc:Fallback>
+        <mc:Fallback xmlns="">
           <p:sp>
             <p:nvSpPr>
               <p:cNvPr id="3" name="Content Placeholder 2">
@@ -13497,7 +13497,7 @@
           <a:p>
             <a:r>
               <a:rPr lang="fr-FR" sz="1600" noProof="0" dirty="0"/>
-              <a:t>À droite, on observe le tracé de la concentration de la solution numérique par rapport à la solution analytique. On voit que ces solutions sont initialement exactes à r = 0.5 mais diverge en s’approchant du centre du cylindre. On peut s’attendre à ce résultat étant donné la condition de Dirichlet qui impose la solution à droite.</a:t>
+              <a:t>À gauche, on observe le tracé de la concentration de la solution numérique par rapport à la solution analytique. On voit que ces solutions sont initialement exactes à r = 0.5 mais diverge en s’approchant du centre du cylindre. On peut s’attendre à ce résultat étant donné la condition de Dirichlet qui impose la solution à droite.</a:t>
             </a:r>
           </a:p>
           <a:p>
@@ -13506,7 +13506,7 @@
           <a:p>
             <a:r>
               <a:rPr lang="fr-FR" sz="1600" noProof="0" dirty="0"/>
-              <a:t>À gauche, pour ce schéma, on obtient un ordre de convergence / pente d’environ 1 pour les trois erreurs. L’erreur commise est de l’ordre de 10</a:t>
+              <a:t>À droite, pour ce schéma, on obtient un ordre de convergence / pente d’environ 1 pour les trois erreurs. L’erreur commise est de l’ordre de 10</a:t>
             </a:r>
             <a:r>
               <a:rPr lang="fr-FR" sz="1600" baseline="30000" noProof="0" dirty="0"/>
@@ -13694,7 +13694,7 @@
           <a:p>
             <a:r>
               <a:rPr lang="fr-FR" sz="1400" noProof="0" dirty="0"/>
-              <a:t>À droite, on observe le tracé de la concentration de la solution numérique par rapport à la solution analytique. On voit que ces solutions sont exactement identiques. Cela est conforme aux attentes d’un schéma d’ordre 2, permettant de résoudre exactement une équation différentielle d’ordre 2.</a:t>
+              <a:t>À gauche, on observe le tracé de la concentration de la solution numérique par rapport à la solution analytique. On voit que ces solutions sont exactement identiques. Cela est conforme aux attentes d’un schéma d’ordre 2, permettant de résoudre exactement une équation différentielle d’ordre 2.</a:t>
             </a:r>
           </a:p>
           <a:p>
@@ -13706,7 +13706,7 @@
           <a:p>
             <a:r>
               <a:rPr lang="fr-FR" sz="1400" noProof="0" dirty="0"/>
-              <a:t>À gauche, pour le schéma à discrétisation centrée, on obtient un ordre de convergence / pente non concluant, variant de -6.51 à -3.17. L’erreur observée est de 10</a:t>
+              <a:t>À droite, pour le schéma à discrétisation centrée, on obtient un ordre de convergence / pente non concluant, variant de -6.51 à -3.17. L’erreur observée est de 10</a:t>
             </a:r>
             <a:r>
               <a:rPr lang="fr-FR" sz="1400" baseline="30000" noProof="0" dirty="0"/>

</xml_diff>

<commit_message>
Ajout de l'adresse du repo
</commit_message>
<xml_diff>
--- a/MEC8211-Devoir1.pptx
+++ b/MEC8211-Devoir1.pptx
@@ -268,7 +268,7 @@
           <a:p>
             <a:fld id="{4E51AFDA-D128-4B68-A211-269E2451E5DE}" type="datetimeFigureOut">
               <a:rPr lang="fr-FR" smtClean="0"/>
-              <a:t>15/02/2026</a:t>
+              <a:t>16/02/2026</a:t>
             </a:fld>
             <a:endParaRPr lang="fr-FR"/>
           </a:p>
@@ -466,7 +466,7 @@
           <a:p>
             <a:fld id="{4E51AFDA-D128-4B68-A211-269E2451E5DE}" type="datetimeFigureOut">
               <a:rPr lang="fr-FR" smtClean="0"/>
-              <a:t>15/02/2026</a:t>
+              <a:t>16/02/2026</a:t>
             </a:fld>
             <a:endParaRPr lang="fr-FR"/>
           </a:p>
@@ -674,7 +674,7 @@
           <a:p>
             <a:fld id="{4E51AFDA-D128-4B68-A211-269E2451E5DE}" type="datetimeFigureOut">
               <a:rPr lang="fr-FR" smtClean="0"/>
-              <a:t>15/02/2026</a:t>
+              <a:t>16/02/2026</a:t>
             </a:fld>
             <a:endParaRPr lang="fr-FR"/>
           </a:p>
@@ -872,7 +872,7 @@
           <a:p>
             <a:fld id="{4E51AFDA-D128-4B68-A211-269E2451E5DE}" type="datetimeFigureOut">
               <a:rPr lang="fr-FR" smtClean="0"/>
-              <a:t>15/02/2026</a:t>
+              <a:t>16/02/2026</a:t>
             </a:fld>
             <a:endParaRPr lang="fr-FR"/>
           </a:p>
@@ -1147,7 +1147,7 @@
           <a:p>
             <a:fld id="{4E51AFDA-D128-4B68-A211-269E2451E5DE}" type="datetimeFigureOut">
               <a:rPr lang="fr-FR" smtClean="0"/>
-              <a:t>15/02/2026</a:t>
+              <a:t>16/02/2026</a:t>
             </a:fld>
             <a:endParaRPr lang="fr-FR"/>
           </a:p>
@@ -1412,7 +1412,7 @@
           <a:p>
             <a:fld id="{4E51AFDA-D128-4B68-A211-269E2451E5DE}" type="datetimeFigureOut">
               <a:rPr lang="fr-FR" smtClean="0"/>
-              <a:t>15/02/2026</a:t>
+              <a:t>16/02/2026</a:t>
             </a:fld>
             <a:endParaRPr lang="fr-FR"/>
           </a:p>
@@ -1824,7 +1824,7 @@
           <a:p>
             <a:fld id="{4E51AFDA-D128-4B68-A211-269E2451E5DE}" type="datetimeFigureOut">
               <a:rPr lang="fr-FR" smtClean="0"/>
-              <a:t>15/02/2026</a:t>
+              <a:t>16/02/2026</a:t>
             </a:fld>
             <a:endParaRPr lang="fr-FR"/>
           </a:p>
@@ -1965,7 +1965,7 @@
           <a:p>
             <a:fld id="{4E51AFDA-D128-4B68-A211-269E2451E5DE}" type="datetimeFigureOut">
               <a:rPr lang="fr-FR" smtClean="0"/>
-              <a:t>15/02/2026</a:t>
+              <a:t>16/02/2026</a:t>
             </a:fld>
             <a:endParaRPr lang="fr-FR"/>
           </a:p>
@@ -2078,7 +2078,7 @@
           <a:p>
             <a:fld id="{4E51AFDA-D128-4B68-A211-269E2451E5DE}" type="datetimeFigureOut">
               <a:rPr lang="fr-FR" smtClean="0"/>
-              <a:t>15/02/2026</a:t>
+              <a:t>16/02/2026</a:t>
             </a:fld>
             <a:endParaRPr lang="fr-FR"/>
           </a:p>
@@ -2389,7 +2389,7 @@
           <a:p>
             <a:fld id="{4E51AFDA-D128-4B68-A211-269E2451E5DE}" type="datetimeFigureOut">
               <a:rPr lang="fr-FR" smtClean="0"/>
-              <a:t>15/02/2026</a:t>
+              <a:t>16/02/2026</a:t>
             </a:fld>
             <a:endParaRPr lang="fr-FR"/>
           </a:p>
@@ -2677,7 +2677,7 @@
           <a:p>
             <a:fld id="{4E51AFDA-D128-4B68-A211-269E2451E5DE}" type="datetimeFigureOut">
               <a:rPr lang="fr-FR" smtClean="0"/>
-              <a:t>15/02/2026</a:t>
+              <a:t>16/02/2026</a:t>
             </a:fld>
             <a:endParaRPr lang="fr-FR"/>
           </a:p>
@@ -2918,7 +2918,7 @@
           <a:p>
             <a:fld id="{4E51AFDA-D128-4B68-A211-269E2451E5DE}" type="datetimeFigureOut">
               <a:rPr lang="fr-FR" smtClean="0"/>
-              <a:t>15/02/2026</a:t>
+              <a:t>16/02/2026</a:t>
             </a:fld>
             <a:endParaRPr lang="fr-FR"/>
           </a:p>
@@ -3381,12 +3381,14 @@
         </p:nvSpPr>
         <p:spPr>
           <a:xfrm>
-            <a:off x="1524000" y="4660817"/>
-            <a:ext cx="9144000" cy="1655762"/>
+            <a:off x="1524000" y="4370832"/>
+            <a:ext cx="9144000" cy="1945747"/>
           </a:xfrm>
         </p:spPr>
         <p:txBody>
-          <a:bodyPr/>
+          <a:bodyPr>
+            <a:normAutofit fontScale="92500" lnSpcReduction="10000"/>
+          </a:bodyPr>
           <a:lstStyle/>
           <a:p>
             <a:r>
@@ -3405,6 +3407,60 @@
               <a:rPr lang="fr-FR" noProof="0" dirty="0"/>
               <a:t>Loïc Vignaud (2485146)</a:t>
             </a:r>
+          </a:p>
+          <a:p>
+            <a:endParaRPr lang="fr-FR" dirty="0"/>
+          </a:p>
+          <a:p>
+            <a:r>
+              <a:rPr lang="fr-FR" sz="2200" dirty="0">
+                <a:hlinkClick r:id="rId2">
+                  <a:extLst>
+                    <a:ext uri="{A12FA001-AC4F-418D-AE19-62706E023703}">
+                      <ahyp:hlinkClr xmlns:ahyp="http://schemas.microsoft.com/office/drawing/2018/hyperlinkcolor" val="tx"/>
+                    </a:ext>
+                  </a:extLst>
+                </a:hlinkClick>
+              </a:rPr>
+              <a:t>Répertoire </a:t>
+            </a:r>
+            <a:r>
+              <a:rPr lang="fr-FR" sz="2200" dirty="0" err="1">
+                <a:hlinkClick r:id="rId2">
+                  <a:extLst>
+                    <a:ext uri="{A12FA001-AC4F-418D-AE19-62706E023703}">
+                      <ahyp:hlinkClr xmlns:ahyp="http://schemas.microsoft.com/office/drawing/2018/hyperlinkcolor" val="tx"/>
+                    </a:ext>
+                  </a:extLst>
+                </a:hlinkClick>
+              </a:rPr>
+              <a:t>Github</a:t>
+            </a:r>
+            <a:r>
+              <a:rPr lang="fr-FR" sz="2200" dirty="0">
+                <a:hlinkClick r:id="rId2">
+                  <a:extLst>
+                    <a:ext uri="{A12FA001-AC4F-418D-AE19-62706E023703}">
+                      <ahyp:hlinkClr xmlns:ahyp="http://schemas.microsoft.com/office/drawing/2018/hyperlinkcolor" val="tx"/>
+                    </a:ext>
+                  </a:extLst>
+                </a:hlinkClick>
+              </a:rPr>
+              <a:t> : </a:t>
+            </a:r>
+            <a:r>
+              <a:rPr lang="fr-FR" sz="2200" u="sng" dirty="0">
+                <a:hlinkClick r:id="rId2">
+                  <a:extLst>
+                    <a:ext uri="{A12FA001-AC4F-418D-AE19-62706E023703}">
+                      <ahyp:hlinkClr xmlns:ahyp="http://schemas.microsoft.com/office/drawing/2018/hyperlinkcolor" val="tx"/>
+                    </a:ext>
+                  </a:extLst>
+                </a:hlinkClick>
+              </a:rPr>
+              <a:t>https://github.com/antoine-pt/MEC6212.git</a:t>
+            </a:r>
+            <a:endParaRPr lang="fr-FR" sz="2200" noProof="0" dirty="0"/>
           </a:p>
         </p:txBody>
       </p:sp>

</xml_diff>